<commit_message>
a little modification of ppt
</commit_message>
<xml_diff>
--- a/MZCARD.pptx
+++ b/MZCARD.pptx
@@ -9793,6 +9793,36 @@
               </a:rPr>
               <a:t>모델 선정 및 예측</a:t>
             </a:r>
+            <a:r>
+              <a:rPr lang="en-US" altLang="ko-KR" sz="3200" b="1" dirty="0">
+                <a:solidFill>
+                  <a:srgbClr val="4B5555"/>
+                </a:solidFill>
+                <a:latin typeface="나눔고딕" panose="020D0604000000000000" pitchFamily="50" charset="-127"/>
+                <a:ea typeface="나눔고딕" panose="020D0604000000000000" pitchFamily="50" charset="-127"/>
+              </a:rPr>
+              <a:t> (</a:t>
+            </a:r>
+            <a:r>
+              <a:rPr lang="ko-KR" altLang="en-US" sz="3200" b="1" dirty="0">
+                <a:solidFill>
+                  <a:srgbClr val="4B5555"/>
+                </a:solidFill>
+                <a:latin typeface="나눔고딕" panose="020D0604000000000000" pitchFamily="50" charset="-127"/>
+                <a:ea typeface="나눔고딕" panose="020D0604000000000000" pitchFamily="50" charset="-127"/>
+              </a:rPr>
+              <a:t>예정</a:t>
+            </a:r>
+            <a:r>
+              <a:rPr lang="en-US" altLang="ko-KR" sz="3200" b="1" dirty="0">
+                <a:solidFill>
+                  <a:srgbClr val="4B5555"/>
+                </a:solidFill>
+                <a:latin typeface="나눔고딕" panose="020D0604000000000000" pitchFamily="50" charset="-127"/>
+                <a:ea typeface="나눔고딕" panose="020D0604000000000000" pitchFamily="50" charset="-127"/>
+              </a:rPr>
+              <a:t>)</a:t>
+            </a:r>
             <a:endParaRPr lang="ko-KR" altLang="en-US" sz="3600" b="1" dirty="0">
               <a:solidFill>
                 <a:srgbClr val="1171A4"/>
@@ -9839,7 +9869,37 @@
                 <a:latin typeface="나눔고딕" panose="020D0604000000000000" pitchFamily="50" charset="-127"/>
                 <a:ea typeface="나눔고딕" panose="020D0604000000000000" pitchFamily="50" charset="-127"/>
               </a:rPr>
-              <a:t>모델 평가 및 결론</a:t>
+              <a:t>모델 평가 및 결론 </a:t>
+            </a:r>
+            <a:r>
+              <a:rPr lang="en-US" altLang="ko-KR" sz="3200" b="1" dirty="0">
+                <a:solidFill>
+                  <a:srgbClr val="4B5555"/>
+                </a:solidFill>
+                <a:latin typeface="나눔고딕" panose="020D0604000000000000" pitchFamily="50" charset="-127"/>
+                <a:ea typeface="나눔고딕" panose="020D0604000000000000" pitchFamily="50" charset="-127"/>
+              </a:rPr>
+              <a:t>(</a:t>
+            </a:r>
+            <a:r>
+              <a:rPr lang="ko-KR" altLang="en-US" sz="3200" b="1" dirty="0">
+                <a:solidFill>
+                  <a:srgbClr val="4B5555"/>
+                </a:solidFill>
+                <a:latin typeface="나눔고딕" panose="020D0604000000000000" pitchFamily="50" charset="-127"/>
+                <a:ea typeface="나눔고딕" panose="020D0604000000000000" pitchFamily="50" charset="-127"/>
+              </a:rPr>
+              <a:t>예정</a:t>
+            </a:r>
+            <a:r>
+              <a:rPr lang="en-US" altLang="ko-KR" sz="3200" b="1" dirty="0">
+                <a:solidFill>
+                  <a:srgbClr val="4B5555"/>
+                </a:solidFill>
+                <a:latin typeface="나눔고딕" panose="020D0604000000000000" pitchFamily="50" charset="-127"/>
+                <a:ea typeface="나눔고딕" panose="020D0604000000000000" pitchFamily="50" charset="-127"/>
+              </a:rPr>
+              <a:t>)</a:t>
             </a:r>
             <a:endParaRPr lang="ko-KR" altLang="en-US" sz="3600" b="1" dirty="0">
               <a:solidFill>

</xml_diff>

<commit_message>
added EDA to the notebook except the geospatial analysis
</commit_message>
<xml_diff>
--- a/MZCARD.pptx
+++ b/MZCARD.pptx
@@ -7120,8 +7120,8 @@
         </p:nvSpPr>
         <p:spPr>
           <a:xfrm>
-            <a:off x="4508126" y="3078134"/>
-            <a:ext cx="3175747" cy="701731"/>
+            <a:off x="4258412" y="3078134"/>
+            <a:ext cx="3675175" cy="701731"/>
           </a:xfrm>
           <a:noFill/>
         </p:spPr>
@@ -7141,27 +7141,8 @@
                 <a:ea typeface="나눔고딕" panose="020D0604000000000000" pitchFamily="50" charset="-127"/>
                 <a:cs typeface="+mn-cs"/>
               </a:rPr>
-              <a:t>질문 </a:t>
-            </a:r>
-            <a:r>
-              <a:rPr lang="ko-KR" altLang="en-US" b="1" dirty="0" err="1">
-                <a:solidFill>
-                  <a:srgbClr val="4B5555"/>
-                </a:solidFill>
-                <a:latin typeface="나눔고딕" panose="020D0604000000000000" pitchFamily="50" charset="-127"/>
-                <a:ea typeface="나눔고딕" panose="020D0604000000000000" pitchFamily="50" charset="-127"/>
-                <a:cs typeface="+mn-cs"/>
-              </a:rPr>
-              <a:t>드루와</a:t>
-            </a:r>
-            <a:endParaRPr lang="ko-KR" altLang="en-US" b="1" dirty="0">
-              <a:solidFill>
-                <a:srgbClr val="4B5555"/>
-              </a:solidFill>
-              <a:latin typeface="나눔고딕" panose="020D0604000000000000" pitchFamily="50" charset="-127"/>
-              <a:ea typeface="나눔고딕" panose="020D0604000000000000" pitchFamily="50" charset="-127"/>
-              <a:cs typeface="+mn-cs"/>
-            </a:endParaRPr>
+              <a:t>끝</a:t>
+            </a:r>
           </a:p>
         </p:txBody>
       </p:sp>

</xml_diff>

<commit_message>
feature importance, edited ppt, added the html report file
</commit_message>
<xml_diff>
--- a/MZCARD.pptx
+++ b/MZCARD.pptx
@@ -35,11 +35,12 @@
     <p:sldId id="315" r:id="rId29"/>
     <p:sldId id="316" r:id="rId30"/>
     <p:sldId id="321" r:id="rId31"/>
-    <p:sldId id="320" r:id="rId32"/>
-    <p:sldId id="322" r:id="rId33"/>
-    <p:sldId id="318" r:id="rId34"/>
-    <p:sldId id="323" r:id="rId35"/>
-    <p:sldId id="266" r:id="rId36"/>
+    <p:sldId id="322" r:id="rId32"/>
+    <p:sldId id="320" r:id="rId33"/>
+    <p:sldId id="323" r:id="rId34"/>
+    <p:sldId id="318" r:id="rId35"/>
+    <p:sldId id="324" r:id="rId36"/>
+    <p:sldId id="266" r:id="rId37"/>
   </p:sldIdLst>
   <p:sldSz cx="12192000" cy="6858000"/>
   <p:notesSz cx="6858000" cy="9144000"/>
@@ -293,7 +294,7 @@
           <a:p>
             <a:fld id="{72316AD9-E501-42FD-AA2F-869DA5381A7E}" type="datetimeFigureOut">
               <a:rPr lang="ko-KR" altLang="en-US" smtClean="0"/>
-              <a:t>2022-10-30</a:t>
+              <a:t>2022. 10. 31.</a:t>
             </a:fld>
             <a:endParaRPr lang="ko-KR" altLang="en-US"/>
           </a:p>
@@ -491,7 +492,7 @@
           <a:p>
             <a:fld id="{72316AD9-E501-42FD-AA2F-869DA5381A7E}" type="datetimeFigureOut">
               <a:rPr lang="ko-KR" altLang="en-US" smtClean="0"/>
-              <a:t>2022-10-30</a:t>
+              <a:t>2022. 10. 31.</a:t>
             </a:fld>
             <a:endParaRPr lang="ko-KR" altLang="en-US"/>
           </a:p>
@@ -699,7 +700,7 @@
           <a:p>
             <a:fld id="{72316AD9-E501-42FD-AA2F-869DA5381A7E}" type="datetimeFigureOut">
               <a:rPr lang="ko-KR" altLang="en-US" smtClean="0"/>
-              <a:t>2022-10-30</a:t>
+              <a:t>2022. 10. 31.</a:t>
             </a:fld>
             <a:endParaRPr lang="ko-KR" altLang="en-US"/>
           </a:p>
@@ -897,7 +898,7 @@
           <a:p>
             <a:fld id="{72316AD9-E501-42FD-AA2F-869DA5381A7E}" type="datetimeFigureOut">
               <a:rPr lang="ko-KR" altLang="en-US" smtClean="0"/>
-              <a:t>2022-10-30</a:t>
+              <a:t>2022. 10. 31.</a:t>
             </a:fld>
             <a:endParaRPr lang="ko-KR" altLang="en-US"/>
           </a:p>
@@ -1172,7 +1173,7 @@
           <a:p>
             <a:fld id="{72316AD9-E501-42FD-AA2F-869DA5381A7E}" type="datetimeFigureOut">
               <a:rPr lang="ko-KR" altLang="en-US" smtClean="0"/>
-              <a:t>2022-10-30</a:t>
+              <a:t>2022. 10. 31.</a:t>
             </a:fld>
             <a:endParaRPr lang="ko-KR" altLang="en-US"/>
           </a:p>
@@ -1437,7 +1438,7 @@
           <a:p>
             <a:fld id="{72316AD9-E501-42FD-AA2F-869DA5381A7E}" type="datetimeFigureOut">
               <a:rPr lang="ko-KR" altLang="en-US" smtClean="0"/>
-              <a:t>2022-10-30</a:t>
+              <a:t>2022. 10. 31.</a:t>
             </a:fld>
             <a:endParaRPr lang="ko-KR" altLang="en-US"/>
           </a:p>
@@ -1849,7 +1850,7 @@
           <a:p>
             <a:fld id="{72316AD9-E501-42FD-AA2F-869DA5381A7E}" type="datetimeFigureOut">
               <a:rPr lang="ko-KR" altLang="en-US" smtClean="0"/>
-              <a:t>2022-10-30</a:t>
+              <a:t>2022. 10. 31.</a:t>
             </a:fld>
             <a:endParaRPr lang="ko-KR" altLang="en-US"/>
           </a:p>
@@ -1990,7 +1991,7 @@
           <a:p>
             <a:fld id="{72316AD9-E501-42FD-AA2F-869DA5381A7E}" type="datetimeFigureOut">
               <a:rPr lang="ko-KR" altLang="en-US" smtClean="0"/>
-              <a:t>2022-10-30</a:t>
+              <a:t>2022. 10. 31.</a:t>
             </a:fld>
             <a:endParaRPr lang="ko-KR" altLang="en-US"/>
           </a:p>
@@ -2103,7 +2104,7 @@
           <a:p>
             <a:fld id="{72316AD9-E501-42FD-AA2F-869DA5381A7E}" type="datetimeFigureOut">
               <a:rPr lang="ko-KR" altLang="en-US" smtClean="0"/>
-              <a:t>2022-10-30</a:t>
+              <a:t>2022. 10. 31.</a:t>
             </a:fld>
             <a:endParaRPr lang="ko-KR" altLang="en-US"/>
           </a:p>
@@ -2414,7 +2415,7 @@
           <a:p>
             <a:fld id="{72316AD9-E501-42FD-AA2F-869DA5381A7E}" type="datetimeFigureOut">
               <a:rPr lang="ko-KR" altLang="en-US" smtClean="0"/>
-              <a:t>2022-10-30</a:t>
+              <a:t>2022. 10. 31.</a:t>
             </a:fld>
             <a:endParaRPr lang="ko-KR" altLang="en-US"/>
           </a:p>
@@ -2702,7 +2703,7 @@
           <a:p>
             <a:fld id="{72316AD9-E501-42FD-AA2F-869DA5381A7E}" type="datetimeFigureOut">
               <a:rPr lang="ko-KR" altLang="en-US" smtClean="0"/>
-              <a:t>2022-10-30</a:t>
+              <a:t>2022. 10. 31.</a:t>
             </a:fld>
             <a:endParaRPr lang="ko-KR" altLang="en-US"/>
           </a:p>
@@ -2943,7 +2944,7 @@
           <a:p>
             <a:fld id="{72316AD9-E501-42FD-AA2F-869DA5381A7E}" type="datetimeFigureOut">
               <a:rPr lang="ko-KR" altLang="en-US" smtClean="0"/>
-              <a:t>2022-10-30</a:t>
+              <a:t>2022. 10. 31.</a:t>
             </a:fld>
             <a:endParaRPr lang="ko-KR" altLang="en-US"/>
           </a:p>
@@ -20658,7 +20659,13 @@
           <p:cNvGraphicFramePr>
             <a:graphicFrameLocks noGrp="1"/>
           </p:cNvGraphicFramePr>
-          <p:nvPr/>
+          <p:nvPr>
+            <p:extLst>
+              <p:ext uri="{D42A27DB-BD31-4B8C-83A1-F6EECF244321}">
+                <p14:modId xmlns:p14="http://schemas.microsoft.com/office/powerpoint/2010/main" val="2126233856"/>
+              </p:ext>
+            </p:extLst>
+          </p:nvPr>
         </p:nvGraphicFramePr>
         <p:xfrm>
           <a:off x="1412779" y="3012596"/>
@@ -20949,13 +20956,7 @@
           <p:cNvGraphicFramePr>
             <a:graphicFrameLocks noGrp="1"/>
           </p:cNvGraphicFramePr>
-          <p:nvPr>
-            <p:extLst>
-              <p:ext uri="{D42A27DB-BD31-4B8C-83A1-F6EECF244321}">
-                <p14:modId xmlns:p14="http://schemas.microsoft.com/office/powerpoint/2010/main" val="3692807324"/>
-              </p:ext>
-            </p:extLst>
-          </p:nvPr>
+          <p:nvPr/>
         </p:nvGraphicFramePr>
         <p:xfrm>
           <a:off x="7622252" y="3012596"/>
@@ -21045,7 +21046,7 @@
                       <a:pPr algn="ctr"/>
                       <a:r>
                         <a:rPr lang="en-US" sz="1600" dirty="0"/>
-                        <a:t>100</a:t>
+                        <a:t>300</a:t>
                       </a:r>
                     </a:p>
                   </a:txBody>
@@ -21174,7 +21175,7 @@
                       <a:pPr algn="ctr"/>
                       <a:r>
                         <a:rPr lang="en-US" sz="1600" dirty="0"/>
-                        <a:t>0</a:t>
+                        <a:t>1</a:t>
                       </a:r>
                     </a:p>
                   </a:txBody>
@@ -21356,7 +21357,7 @@
           <p:spPr>
             <a:xfrm>
               <a:off x="4870416" y="4635299"/>
-              <a:ext cx="2563871" cy="307777"/>
+              <a:ext cx="2563871" cy="338554"/>
             </a:xfrm>
             <a:prstGeom prst="rect">
               <a:avLst/>
@@ -21383,8 +21384,16 @@
             </a:lstStyle>
             <a:p>
               <a:r>
+                <a:rPr lang="en-US" altLang="ko-KR" dirty="0"/>
+                <a:t>SMOTE</a:t>
+              </a:r>
+              <a:r>
+                <a:rPr lang="ko-KR" altLang="en-US" dirty="0"/>
+                <a:t> </a:t>
+              </a:r>
+              <a:r>
                 <a:rPr lang="ko-KR" altLang="en-US" dirty="0" err="1"/>
-                <a:t>언더샘플링</a:t>
+                <a:t>오버샘플링</a:t>
               </a:r>
               <a:r>
                 <a:rPr lang="ko-KR" altLang="en-US" dirty="0"/>
@@ -21397,7 +21406,7 @@
     </p:spTree>
     <p:extLst>
       <p:ext uri="{BB962C8B-B14F-4D97-AF65-F5344CB8AC3E}">
-        <p14:creationId xmlns:p14="http://schemas.microsoft.com/office/powerpoint/2010/main" val="2473648630"/>
+        <p14:creationId xmlns:p14="http://schemas.microsoft.com/office/powerpoint/2010/main" val="3196836218"/>
       </p:ext>
     </p:extLst>
   </p:cSld>
@@ -21659,13 +21668,7 @@
           <p:cNvGraphicFramePr>
             <a:graphicFrameLocks noGrp="1"/>
           </p:cNvGraphicFramePr>
-          <p:nvPr>
-            <p:extLst>
-              <p:ext uri="{D42A27DB-BD31-4B8C-83A1-F6EECF244321}">
-                <p14:modId xmlns:p14="http://schemas.microsoft.com/office/powerpoint/2010/main" val="2126233856"/>
-              </p:ext>
-            </p:extLst>
-          </p:nvPr>
+          <p:nvPr/>
         </p:nvGraphicFramePr>
         <p:xfrm>
           <a:off x="1412779" y="3012596"/>
@@ -21956,7 +21959,13 @@
           <p:cNvGraphicFramePr>
             <a:graphicFrameLocks noGrp="1"/>
           </p:cNvGraphicFramePr>
-          <p:nvPr/>
+          <p:nvPr>
+            <p:extLst>
+              <p:ext uri="{D42A27DB-BD31-4B8C-83A1-F6EECF244321}">
+                <p14:modId xmlns:p14="http://schemas.microsoft.com/office/powerpoint/2010/main" val="3692807324"/>
+              </p:ext>
+            </p:extLst>
+          </p:nvPr>
         </p:nvGraphicFramePr>
         <p:xfrm>
           <a:off x="7622252" y="3012596"/>
@@ -22046,7 +22055,7 @@
                       <a:pPr algn="ctr"/>
                       <a:r>
                         <a:rPr lang="en-US" sz="1600" dirty="0"/>
-                        <a:t>300</a:t>
+                        <a:t>100</a:t>
                       </a:r>
                     </a:p>
                   </a:txBody>
@@ -22175,7 +22184,7 @@
                       <a:pPr algn="ctr"/>
                       <a:r>
                         <a:rPr lang="en-US" sz="1600" dirty="0"/>
-                        <a:t>1</a:t>
+                        <a:t>0</a:t>
                       </a:r>
                     </a:p>
                   </a:txBody>
@@ -22357,7 +22366,7 @@
           <p:spPr>
             <a:xfrm>
               <a:off x="4870416" y="4635299"/>
-              <a:ext cx="2563871" cy="338554"/>
+              <a:ext cx="2563871" cy="307777"/>
             </a:xfrm>
             <a:prstGeom prst="rect">
               <a:avLst/>
@@ -22384,16 +22393,8 @@
             </a:lstStyle>
             <a:p>
               <a:r>
-                <a:rPr lang="en-US" altLang="ko-KR" dirty="0"/>
-                <a:t>SMOTE</a:t>
-              </a:r>
-              <a:r>
-                <a:rPr lang="ko-KR" altLang="en-US" dirty="0"/>
-                <a:t> </a:t>
-              </a:r>
-              <a:r>
                 <a:rPr lang="ko-KR" altLang="en-US" dirty="0" err="1"/>
-                <a:t>오버샘플링</a:t>
+                <a:t>언더샘플링</a:t>
               </a:r>
               <a:r>
                 <a:rPr lang="ko-KR" altLang="en-US" dirty="0"/>
@@ -22406,7 +22407,7 @@
     </p:spTree>
     <p:extLst>
       <p:ext uri="{BB962C8B-B14F-4D97-AF65-F5344CB8AC3E}">
-        <p14:creationId xmlns:p14="http://schemas.microsoft.com/office/powerpoint/2010/main" val="3196836218"/>
+        <p14:creationId xmlns:p14="http://schemas.microsoft.com/office/powerpoint/2010/main" val="2473648630"/>
       </p:ext>
     </p:extLst>
   </p:cSld>
@@ -22417,861 +22418,6 @@
 </file>
 
 <file path=ppt/slides/slide33.xml><?xml version="1.0" encoding="utf-8"?>
-<p:sld xmlns:a="http://schemas.openxmlformats.org/drawingml/2006/main" xmlns:r="http://schemas.openxmlformats.org/officeDocument/2006/relationships" xmlns:p="http://schemas.openxmlformats.org/presentationml/2006/main">
-  <p:cSld>
-    <p:spTree>
-      <p:nvGrpSpPr>
-        <p:cNvPr id="1" name=""/>
-        <p:cNvGrpSpPr/>
-        <p:nvPr/>
-      </p:nvGrpSpPr>
-      <p:grpSpPr>
-        <a:xfrm>
-          <a:off x="0" y="0"/>
-          <a:ext cx="0" cy="0"/>
-          <a:chOff x="0" y="0"/>
-          <a:chExt cx="0" cy="0"/>
-        </a:xfrm>
-      </p:grpSpPr>
-      <p:pic>
-        <p:nvPicPr>
-          <p:cNvPr id="8194" name="Picture 2">
-            <a:extLst>
-              <a:ext uri="{FF2B5EF4-FFF2-40B4-BE49-F238E27FC236}">
-                <a16:creationId xmlns:a16="http://schemas.microsoft.com/office/drawing/2014/main" id="{6D41FEA4-ED51-7F2C-126B-79F611D3A14A}"/>
-              </a:ext>
-            </a:extLst>
-          </p:cNvPr>
-          <p:cNvPicPr>
-            <a:picLocks noChangeAspect="1" noChangeArrowheads="1"/>
-          </p:cNvPicPr>
-          <p:nvPr/>
-        </p:nvPicPr>
-        <p:blipFill>
-          <a:blip r:embed="rId2">
-            <a:extLst>
-              <a:ext uri="{28A0092B-C50C-407E-A947-70E740481C1C}">
-                <a14:useLocalDpi xmlns:a14="http://schemas.microsoft.com/office/drawing/2010/main" val="0"/>
-              </a:ext>
-            </a:extLst>
-          </a:blip>
-          <a:srcRect/>
-          <a:stretch>
-            <a:fillRect/>
-          </a:stretch>
-        </p:blipFill>
-        <p:spPr bwMode="auto">
-          <a:xfrm>
-            <a:off x="6428847" y="2346097"/>
-            <a:ext cx="5251440" cy="3949016"/>
-          </a:xfrm>
-          <a:prstGeom prst="rect">
-            <a:avLst/>
-          </a:prstGeom>
-          <a:noFill/>
-          <a:extLst>
-            <a:ext uri="{909E8E84-426E-40DD-AFC4-6F175D3DCCD1}">
-              <a14:hiddenFill xmlns:a14="http://schemas.microsoft.com/office/drawing/2010/main">
-                <a:solidFill>
-                  <a:srgbClr val="FFFFFF"/>
-                </a:solidFill>
-              </a14:hiddenFill>
-            </a:ext>
-          </a:extLst>
-        </p:spPr>
-      </p:pic>
-      <p:cxnSp>
-        <p:nvCxnSpPr>
-          <p:cNvPr id="3" name="직선 연결선 2"/>
-          <p:cNvCxnSpPr/>
-          <p:nvPr/>
-        </p:nvCxnSpPr>
-        <p:spPr>
-          <a:xfrm>
-            <a:off x="254000" y="362675"/>
-            <a:ext cx="11671300" cy="0"/>
-          </a:xfrm>
-          <a:prstGeom prst="line">
-            <a:avLst/>
-          </a:prstGeom>
-          <a:ln w="6350">
-            <a:solidFill>
-              <a:srgbClr val="4B5555"/>
-            </a:solidFill>
-          </a:ln>
-        </p:spPr>
-        <p:style>
-          <a:lnRef idx="1">
-            <a:schemeClr val="accent1"/>
-          </a:lnRef>
-          <a:fillRef idx="0">
-            <a:schemeClr val="accent1"/>
-          </a:fillRef>
-          <a:effectRef idx="0">
-            <a:schemeClr val="accent1"/>
-          </a:effectRef>
-          <a:fontRef idx="minor">
-            <a:schemeClr val="tx1"/>
-          </a:fontRef>
-        </p:style>
-      </p:cxnSp>
-      <p:sp>
-        <p:nvSpPr>
-          <p:cNvPr id="2" name="TextBox 1">
-            <a:extLst>
-              <a:ext uri="{FF2B5EF4-FFF2-40B4-BE49-F238E27FC236}">
-                <a16:creationId xmlns:a16="http://schemas.microsoft.com/office/drawing/2014/main" id="{B83E3735-A258-661D-A015-36D6B5886803}"/>
-              </a:ext>
-            </a:extLst>
-          </p:cNvPr>
-          <p:cNvSpPr txBox="1"/>
-          <p:nvPr/>
-        </p:nvSpPr>
-        <p:spPr>
-          <a:xfrm>
-            <a:off x="266700" y="0"/>
-            <a:ext cx="1350049" cy="400110"/>
-          </a:xfrm>
-          <a:prstGeom prst="rect">
-            <a:avLst/>
-          </a:prstGeom>
-          <a:noFill/>
-        </p:spPr>
-        <p:txBody>
-          <a:bodyPr wrap="none" rtlCol="0">
-            <a:spAutoFit/>
-          </a:bodyPr>
-          <a:lstStyle/>
-          <a:p>
-            <a:pPr algn="ctr"/>
-            <a:r>
-              <a:rPr lang="en-US" altLang="ko-KR" sz="2000" b="1" dirty="0">
-                <a:solidFill>
-                  <a:srgbClr val="4B5555"/>
-                </a:solidFill>
-                <a:latin typeface="나눔고딕" panose="020D0604000000000000" pitchFamily="50" charset="-127"/>
-                <a:ea typeface="나눔고딕" panose="020D0604000000000000" pitchFamily="50" charset="-127"/>
-              </a:rPr>
-              <a:t>MZ</a:t>
-            </a:r>
-            <a:r>
-              <a:rPr lang="ko-KR" altLang="en-US" sz="2000" b="1" dirty="0">
-                <a:solidFill>
-                  <a:srgbClr val="4B5555"/>
-                </a:solidFill>
-                <a:latin typeface="나눔고딕" panose="020D0604000000000000" pitchFamily="50" charset="-127"/>
-                <a:ea typeface="나눔고딕" panose="020D0604000000000000" pitchFamily="50" charset="-127"/>
-              </a:rPr>
-              <a:t> </a:t>
-            </a:r>
-            <a:r>
-              <a:rPr lang="en-US" altLang="ko-KR" sz="2000" b="1" dirty="0">
-                <a:solidFill>
-                  <a:srgbClr val="4B5555"/>
-                </a:solidFill>
-                <a:latin typeface="나눔고딕" panose="020D0604000000000000" pitchFamily="50" charset="-127"/>
-                <a:ea typeface="나눔고딕" panose="020D0604000000000000" pitchFamily="50" charset="-127"/>
-              </a:rPr>
-              <a:t>CARD</a:t>
-            </a:r>
-            <a:endParaRPr lang="ko-KR" altLang="en-US" sz="2400" b="1" dirty="0">
-              <a:solidFill>
-                <a:srgbClr val="1171A4"/>
-              </a:solidFill>
-              <a:latin typeface="나눔고딕" panose="020D0604000000000000" pitchFamily="50" charset="-127"/>
-              <a:ea typeface="나눔고딕" panose="020D0604000000000000" pitchFamily="50" charset="-127"/>
-            </a:endParaRPr>
-          </a:p>
-        </p:txBody>
-      </p:sp>
-      <p:sp>
-        <p:nvSpPr>
-          <p:cNvPr id="5" name="TextBox 4">
-            <a:extLst>
-              <a:ext uri="{FF2B5EF4-FFF2-40B4-BE49-F238E27FC236}">
-                <a16:creationId xmlns:a16="http://schemas.microsoft.com/office/drawing/2014/main" id="{A0E380EB-5AEA-7826-3418-B45EA28E6AD7}"/>
-              </a:ext>
-            </a:extLst>
-          </p:cNvPr>
-          <p:cNvSpPr txBox="1"/>
-          <p:nvPr/>
-        </p:nvSpPr>
-        <p:spPr>
-          <a:xfrm>
-            <a:off x="511712" y="1154331"/>
-            <a:ext cx="11015270" cy="400110"/>
-          </a:xfrm>
-          <a:prstGeom prst="rect">
-            <a:avLst/>
-          </a:prstGeom>
-          <a:noFill/>
-        </p:spPr>
-        <p:txBody>
-          <a:bodyPr wrap="square" rtlCol="0">
-            <a:spAutoFit/>
-          </a:bodyPr>
-          <a:lstStyle/>
-          <a:p>
-            <a:r>
-              <a:rPr lang="ko-KR" altLang="en-US" sz="2000" b="1" dirty="0">
-                <a:solidFill>
-                  <a:srgbClr val="4B5555"/>
-                </a:solidFill>
-                <a:latin typeface="나눔고딕" panose="020D0604000000000000" pitchFamily="50" charset="-127"/>
-                <a:ea typeface="나눔고딕" panose="020D0604000000000000" pitchFamily="50" charset="-127"/>
-              </a:rPr>
-              <a:t>최적 </a:t>
-            </a:r>
-            <a:r>
-              <a:rPr lang="en-US" altLang="ko-KR" sz="2000" b="1" dirty="0">
-                <a:solidFill>
-                  <a:srgbClr val="4B5555"/>
-                </a:solidFill>
-                <a:latin typeface="나눔고딕" panose="020D0604000000000000" pitchFamily="50" charset="-127"/>
-                <a:ea typeface="나눔고딕" panose="020D0604000000000000" pitchFamily="50" charset="-127"/>
-              </a:rPr>
-              <a:t>Hyperparameters </a:t>
-            </a:r>
-            <a:r>
-              <a:rPr lang="ko-KR" altLang="en-US" sz="2000" b="1" dirty="0">
-                <a:solidFill>
-                  <a:srgbClr val="4B5555"/>
-                </a:solidFill>
-                <a:latin typeface="나눔고딕" panose="020D0604000000000000" pitchFamily="50" charset="-127"/>
-                <a:ea typeface="나눔고딕" panose="020D0604000000000000" pitchFamily="50" charset="-127"/>
-              </a:rPr>
-              <a:t>이용한 테스트 데이터 예측 </a:t>
-            </a:r>
-            <a:r>
-              <a:rPr lang="en-US" altLang="ko-KR" sz="2000" b="1" dirty="0">
-                <a:solidFill>
-                  <a:srgbClr val="4B5555"/>
-                </a:solidFill>
-                <a:latin typeface="나눔고딕" panose="020D0604000000000000" pitchFamily="50" charset="-127"/>
-                <a:ea typeface="나눔고딕" panose="020D0604000000000000" pitchFamily="50" charset="-127"/>
-              </a:rPr>
-              <a:t>(</a:t>
-            </a:r>
-            <a:r>
-              <a:rPr lang="ko-KR" altLang="en-US" sz="2000" b="1" dirty="0" err="1">
-                <a:solidFill>
-                  <a:srgbClr val="4B5555"/>
-                </a:solidFill>
-                <a:latin typeface="나눔고딕" panose="020D0604000000000000" pitchFamily="50" charset="-127"/>
-                <a:ea typeface="나눔고딕" panose="020D0604000000000000" pitchFamily="50" charset="-127"/>
-              </a:rPr>
-              <a:t>언더샘플링</a:t>
-            </a:r>
-            <a:r>
-              <a:rPr lang="ko-KR" altLang="en-US" sz="2000" b="1" dirty="0">
-                <a:solidFill>
-                  <a:srgbClr val="4B5555"/>
-                </a:solidFill>
-                <a:latin typeface="나눔고딕" panose="020D0604000000000000" pitchFamily="50" charset="-127"/>
-                <a:ea typeface="나눔고딕" panose="020D0604000000000000" pitchFamily="50" charset="-127"/>
-              </a:rPr>
-              <a:t> 데이터로 학습한 모델 이용</a:t>
-            </a:r>
-            <a:r>
-              <a:rPr lang="en-US" altLang="ko-KR" sz="2000" b="1" dirty="0">
-                <a:solidFill>
-                  <a:srgbClr val="4B5555"/>
-                </a:solidFill>
-                <a:latin typeface="나눔고딕" panose="020D0604000000000000" pitchFamily="50" charset="-127"/>
-                <a:ea typeface="나눔고딕" panose="020D0604000000000000" pitchFamily="50" charset="-127"/>
-              </a:rPr>
-              <a:t>)</a:t>
-            </a:r>
-            <a:endParaRPr lang="ko-KR" altLang="en-US" sz="2400" b="1" dirty="0">
-              <a:solidFill>
-                <a:srgbClr val="1171A4"/>
-              </a:solidFill>
-              <a:latin typeface="나눔고딕" panose="020D0604000000000000" pitchFamily="50" charset="-127"/>
-              <a:ea typeface="나눔고딕" panose="020D0604000000000000" pitchFamily="50" charset="-127"/>
-            </a:endParaRPr>
-          </a:p>
-        </p:txBody>
-      </p:sp>
-      <p:sp>
-        <p:nvSpPr>
-          <p:cNvPr id="11" name="TextBox 10">
-            <a:extLst>
-              <a:ext uri="{FF2B5EF4-FFF2-40B4-BE49-F238E27FC236}">
-                <a16:creationId xmlns:a16="http://schemas.microsoft.com/office/drawing/2014/main" id="{6B287F43-05E7-F9C8-9D59-1E9EA41EFBC6}"/>
-              </a:ext>
-            </a:extLst>
-          </p:cNvPr>
-          <p:cNvSpPr txBox="1"/>
-          <p:nvPr/>
-        </p:nvSpPr>
-        <p:spPr>
-          <a:xfrm>
-            <a:off x="511713" y="508000"/>
-            <a:ext cx="1053494" cy="646331"/>
-          </a:xfrm>
-          <a:prstGeom prst="rect">
-            <a:avLst/>
-          </a:prstGeom>
-          <a:noFill/>
-        </p:spPr>
-        <p:txBody>
-          <a:bodyPr wrap="none" rtlCol="0">
-            <a:spAutoFit/>
-          </a:bodyPr>
-          <a:lstStyle/>
-          <a:p>
-            <a:r>
-              <a:rPr lang="ko-KR" altLang="en-US" sz="3600" b="1" dirty="0">
-                <a:solidFill>
-                  <a:srgbClr val="1171A4"/>
-                </a:solidFill>
-                <a:latin typeface="나눔고딕" panose="020D0604000000000000" pitchFamily="50" charset="-127"/>
-                <a:ea typeface="나눔고딕" panose="020D0604000000000000" pitchFamily="50" charset="-127"/>
-              </a:rPr>
-              <a:t>결과</a:t>
-            </a:r>
-          </a:p>
-        </p:txBody>
-      </p:sp>
-      <p:graphicFrame>
-        <p:nvGraphicFramePr>
-          <p:cNvPr id="4" name="Table 6">
-            <a:extLst>
-              <a:ext uri="{FF2B5EF4-FFF2-40B4-BE49-F238E27FC236}">
-                <a16:creationId xmlns:a16="http://schemas.microsoft.com/office/drawing/2014/main" id="{E1CB77EF-B8F5-C130-8F3A-0A11EEB3C0FC}"/>
-              </a:ext>
-            </a:extLst>
-          </p:cNvPr>
-          <p:cNvGraphicFramePr>
-            <a:graphicFrameLocks noGrp="1"/>
-          </p:cNvGraphicFramePr>
-          <p:nvPr>
-            <p:extLst>
-              <p:ext uri="{D42A27DB-BD31-4B8C-83A1-F6EECF244321}">
-                <p14:modId xmlns:p14="http://schemas.microsoft.com/office/powerpoint/2010/main" val="596038857"/>
-              </p:ext>
-            </p:extLst>
-          </p:nvPr>
-        </p:nvGraphicFramePr>
-        <p:xfrm>
-          <a:off x="1064029" y="2849059"/>
-          <a:ext cx="4893428" cy="2140020"/>
-        </p:xfrm>
-        <a:graphic>
-          <a:graphicData uri="http://schemas.openxmlformats.org/drawingml/2006/table">
-            <a:tbl>
-              <a:tblPr firstRow="1" firstCol="1" bandRow="1">
-                <a:tableStyleId>{7DF18680-E054-41AD-8BC1-D1AEF772440D}</a:tableStyleId>
-              </a:tblPr>
-              <a:tblGrid>
-                <a:gridCol w="1223357">
-                  <a:extLst>
-                    <a:ext uri="{9D8B030D-6E8A-4147-A177-3AD203B41FA5}">
-                      <a16:colId xmlns:a16="http://schemas.microsoft.com/office/drawing/2014/main" val="1625168884"/>
-                    </a:ext>
-                  </a:extLst>
-                </a:gridCol>
-                <a:gridCol w="1223357">
-                  <a:extLst>
-                    <a:ext uri="{9D8B030D-6E8A-4147-A177-3AD203B41FA5}">
-                      <a16:colId xmlns:a16="http://schemas.microsoft.com/office/drawing/2014/main" val="2651069430"/>
-                    </a:ext>
-                  </a:extLst>
-                </a:gridCol>
-                <a:gridCol w="1223357">
-                  <a:extLst>
-                    <a:ext uri="{9D8B030D-6E8A-4147-A177-3AD203B41FA5}">
-                      <a16:colId xmlns:a16="http://schemas.microsoft.com/office/drawing/2014/main" val="1866455031"/>
-                    </a:ext>
-                  </a:extLst>
-                </a:gridCol>
-                <a:gridCol w="1223357">
-                  <a:extLst>
-                    <a:ext uri="{9D8B030D-6E8A-4147-A177-3AD203B41FA5}">
-                      <a16:colId xmlns:a16="http://schemas.microsoft.com/office/drawing/2014/main" val="2199166166"/>
-                    </a:ext>
-                  </a:extLst>
-                </a:gridCol>
-              </a:tblGrid>
-              <a:tr h="354852">
-                <a:tc>
-                  <a:txBody>
-                    <a:bodyPr/>
-                    <a:lstStyle/>
-                    <a:p>
-                      <a:endParaRPr lang="en-US" dirty="0"/>
-                    </a:p>
-                  </a:txBody>
-                  <a:tcPr/>
-                </a:tc>
-                <a:tc>
-                  <a:txBody>
-                    <a:bodyPr/>
-                    <a:lstStyle/>
-                    <a:p>
-                      <a:pPr algn="ctr"/>
-                      <a:r>
-                        <a:rPr lang="en-US" sz="1200" dirty="0"/>
-                        <a:t>precision</a:t>
-                      </a:r>
-                    </a:p>
-                  </a:txBody>
-                  <a:tcPr anchor="ctr"/>
-                </a:tc>
-                <a:tc>
-                  <a:txBody>
-                    <a:bodyPr/>
-                    <a:lstStyle/>
-                    <a:p>
-                      <a:pPr algn="ctr"/>
-                      <a:r>
-                        <a:rPr lang="en-US" sz="1200" dirty="0"/>
-                        <a:t>recall</a:t>
-                      </a:r>
-                    </a:p>
-                  </a:txBody>
-                  <a:tcPr anchor="ctr"/>
-                </a:tc>
-                <a:tc>
-                  <a:txBody>
-                    <a:bodyPr/>
-                    <a:lstStyle/>
-                    <a:p>
-                      <a:pPr algn="ctr"/>
-                      <a:r>
-                        <a:rPr lang="en-US" sz="1200" dirty="0"/>
-                        <a:t>F1-score</a:t>
-                      </a:r>
-                    </a:p>
-                  </a:txBody>
-                  <a:tcPr anchor="ctr"/>
-                </a:tc>
-                <a:extLst>
-                  <a:ext uri="{0D108BD9-81ED-4DB2-BD59-A6C34878D82A}">
-                    <a16:rowId xmlns:a16="http://schemas.microsoft.com/office/drawing/2014/main" val="1646888325"/>
-                  </a:ext>
-                </a:extLst>
-              </a:tr>
-              <a:tr h="354852">
-                <a:tc>
-                  <a:txBody>
-                    <a:bodyPr/>
-                    <a:lstStyle/>
-                    <a:p>
-                      <a:pPr marL="0" algn="ctr" defTabSz="914400" rtl="0" eaLnBrk="1" latinLnBrk="1" hangingPunct="1"/>
-                      <a:r>
-                        <a:rPr lang="en-US" sz="1200" b="1" kern="1200" dirty="0">
-                          <a:solidFill>
-                            <a:schemeClr val="lt1"/>
-                          </a:solidFill>
-                          <a:latin typeface="+mn-lt"/>
-                          <a:ea typeface="+mn-ea"/>
-                          <a:cs typeface="+mn-cs"/>
-                        </a:rPr>
-                        <a:t>0</a:t>
-                      </a:r>
-                    </a:p>
-                  </a:txBody>
-                  <a:tcPr anchor="ctr"/>
-                </a:tc>
-                <a:tc>
-                  <a:txBody>
-                    <a:bodyPr/>
-                    <a:lstStyle/>
-                    <a:p>
-                      <a:pPr algn="r"/>
-                      <a:r>
-                        <a:rPr lang="en-US" sz="1400" dirty="0"/>
-                        <a:t>1.00</a:t>
-                      </a:r>
-                    </a:p>
-                  </a:txBody>
-                  <a:tcPr anchor="ctr"/>
-                </a:tc>
-                <a:tc>
-                  <a:txBody>
-                    <a:bodyPr/>
-                    <a:lstStyle/>
-                    <a:p>
-                      <a:pPr algn="r"/>
-                      <a:r>
-                        <a:rPr lang="en-US" sz="1400" dirty="0"/>
-                        <a:t>1.00</a:t>
-                      </a:r>
-                    </a:p>
-                  </a:txBody>
-                  <a:tcPr anchor="ctr"/>
-                </a:tc>
-                <a:tc>
-                  <a:txBody>
-                    <a:bodyPr/>
-                    <a:lstStyle/>
-                    <a:p>
-                      <a:pPr algn="r"/>
-                      <a:r>
-                        <a:rPr lang="en-US" sz="1400" dirty="0"/>
-                        <a:t>1.00</a:t>
-                      </a:r>
-                    </a:p>
-                  </a:txBody>
-                  <a:tcPr anchor="ctr"/>
-                </a:tc>
-                <a:extLst>
-                  <a:ext uri="{0D108BD9-81ED-4DB2-BD59-A6C34878D82A}">
-                    <a16:rowId xmlns:a16="http://schemas.microsoft.com/office/drawing/2014/main" val="3607368520"/>
-                  </a:ext>
-                </a:extLst>
-              </a:tr>
-              <a:tr h="354852">
-                <a:tc>
-                  <a:txBody>
-                    <a:bodyPr/>
-                    <a:lstStyle/>
-                    <a:p>
-                      <a:pPr marL="0" algn="ctr" defTabSz="914400" rtl="0" eaLnBrk="1" latinLnBrk="1" hangingPunct="1"/>
-                      <a:r>
-                        <a:rPr lang="en-US" sz="1200" b="1" kern="1200" dirty="0">
-                          <a:solidFill>
-                            <a:schemeClr val="lt1"/>
-                          </a:solidFill>
-                          <a:latin typeface="+mn-lt"/>
-                          <a:ea typeface="+mn-ea"/>
-                          <a:cs typeface="+mn-cs"/>
-                        </a:rPr>
-                        <a:t>1</a:t>
-                      </a:r>
-                    </a:p>
-                  </a:txBody>
-                  <a:tcPr anchor="ctr"/>
-                </a:tc>
-                <a:tc>
-                  <a:txBody>
-                    <a:bodyPr/>
-                    <a:lstStyle/>
-                    <a:p>
-                      <a:pPr algn="r"/>
-                      <a:r>
-                        <a:rPr lang="en-US" sz="1400" dirty="0"/>
-                        <a:t>0.15</a:t>
-                      </a:r>
-                    </a:p>
-                  </a:txBody>
-                  <a:tcPr anchor="ctr"/>
-                </a:tc>
-                <a:tc>
-                  <a:txBody>
-                    <a:bodyPr/>
-                    <a:lstStyle/>
-                    <a:p>
-                      <a:pPr algn="r"/>
-                      <a:r>
-                        <a:rPr lang="en-US" sz="1400" dirty="0"/>
-                        <a:t>0.97</a:t>
-                      </a:r>
-                    </a:p>
-                  </a:txBody>
-                  <a:tcPr anchor="ctr"/>
-                </a:tc>
-                <a:tc>
-                  <a:txBody>
-                    <a:bodyPr/>
-                    <a:lstStyle/>
-                    <a:p>
-                      <a:pPr algn="r"/>
-                      <a:r>
-                        <a:rPr lang="en-US" sz="1400" dirty="0"/>
-                        <a:t>0.25</a:t>
-                      </a:r>
-                    </a:p>
-                  </a:txBody>
-                  <a:tcPr anchor="ctr"/>
-                </a:tc>
-                <a:extLst>
-                  <a:ext uri="{0D108BD9-81ED-4DB2-BD59-A6C34878D82A}">
-                    <a16:rowId xmlns:a16="http://schemas.microsoft.com/office/drawing/2014/main" val="1182080453"/>
-                  </a:ext>
-                </a:extLst>
-              </a:tr>
-              <a:tr h="354852">
-                <a:tc>
-                  <a:txBody>
-                    <a:bodyPr/>
-                    <a:lstStyle/>
-                    <a:p>
-                      <a:pPr marL="0" algn="ctr" defTabSz="914400" rtl="0" eaLnBrk="1" latinLnBrk="1" hangingPunct="1"/>
-                      <a:r>
-                        <a:rPr lang="en-US" sz="1200" b="1" kern="1200" dirty="0">
-                          <a:solidFill>
-                            <a:schemeClr val="lt1"/>
-                          </a:solidFill>
-                          <a:latin typeface="+mn-lt"/>
-                          <a:ea typeface="+mn-ea"/>
-                          <a:cs typeface="+mn-cs"/>
-                        </a:rPr>
-                        <a:t>accuracy</a:t>
-                      </a:r>
-                    </a:p>
-                  </a:txBody>
-                  <a:tcPr anchor="ctr"/>
-                </a:tc>
-                <a:tc>
-                  <a:txBody>
-                    <a:bodyPr/>
-                    <a:lstStyle/>
-                    <a:p>
-                      <a:pPr algn="r"/>
-                      <a:endParaRPr lang="en-US" sz="1400" dirty="0"/>
-                    </a:p>
-                  </a:txBody>
-                  <a:tcPr anchor="ctr"/>
-                </a:tc>
-                <a:tc>
-                  <a:txBody>
-                    <a:bodyPr/>
-                    <a:lstStyle/>
-                    <a:p>
-                      <a:pPr algn="r"/>
-                      <a:endParaRPr lang="en-US" sz="1400" dirty="0"/>
-                    </a:p>
-                  </a:txBody>
-                  <a:tcPr anchor="ctr"/>
-                </a:tc>
-                <a:tc>
-                  <a:txBody>
-                    <a:bodyPr/>
-                    <a:lstStyle/>
-                    <a:p>
-                      <a:pPr algn="r"/>
-                      <a:r>
-                        <a:rPr lang="en-US" sz="1400" dirty="0"/>
-                        <a:t>0.98</a:t>
-                      </a:r>
-                    </a:p>
-                  </a:txBody>
-                  <a:tcPr anchor="ctr"/>
-                </a:tc>
-                <a:extLst>
-                  <a:ext uri="{0D108BD9-81ED-4DB2-BD59-A6C34878D82A}">
-                    <a16:rowId xmlns:a16="http://schemas.microsoft.com/office/drawing/2014/main" val="2581843712"/>
-                  </a:ext>
-                </a:extLst>
-              </a:tr>
-              <a:tr h="354852">
-                <a:tc>
-                  <a:txBody>
-                    <a:bodyPr/>
-                    <a:lstStyle/>
-                    <a:p>
-                      <a:pPr marL="0" algn="ctr" defTabSz="914400" rtl="0" eaLnBrk="1" latinLnBrk="1" hangingPunct="1"/>
-                      <a:r>
-                        <a:rPr lang="en-US" sz="1200" b="1" kern="1200" dirty="0">
-                          <a:solidFill>
-                            <a:schemeClr val="lt1"/>
-                          </a:solidFill>
-                          <a:latin typeface="+mn-lt"/>
-                          <a:ea typeface="+mn-ea"/>
-                          <a:cs typeface="+mn-cs"/>
-                        </a:rPr>
-                        <a:t>macro avg</a:t>
-                      </a:r>
-                    </a:p>
-                  </a:txBody>
-                  <a:tcPr anchor="ctr"/>
-                </a:tc>
-                <a:tc>
-                  <a:txBody>
-                    <a:bodyPr/>
-                    <a:lstStyle/>
-                    <a:p>
-                      <a:pPr algn="r"/>
-                      <a:r>
-                        <a:rPr lang="en-US" sz="1400" dirty="0"/>
-                        <a:t>0.57</a:t>
-                      </a:r>
-                    </a:p>
-                  </a:txBody>
-                  <a:tcPr anchor="ctr"/>
-                </a:tc>
-                <a:tc>
-                  <a:txBody>
-                    <a:bodyPr/>
-                    <a:lstStyle/>
-                    <a:p>
-                      <a:pPr algn="r"/>
-                      <a:r>
-                        <a:rPr lang="en-US" sz="1400" dirty="0"/>
-                        <a:t>0.97</a:t>
-                      </a:r>
-                    </a:p>
-                  </a:txBody>
-                  <a:tcPr anchor="ctr"/>
-                </a:tc>
-                <a:tc>
-                  <a:txBody>
-                    <a:bodyPr/>
-                    <a:lstStyle/>
-                    <a:p>
-                      <a:pPr algn="r"/>
-                      <a:r>
-                        <a:rPr lang="en-US" sz="1400" dirty="0"/>
-                        <a:t>0.62</a:t>
-                      </a:r>
-                    </a:p>
-                  </a:txBody>
-                  <a:tcPr anchor="ctr"/>
-                </a:tc>
-                <a:extLst>
-                  <a:ext uri="{0D108BD9-81ED-4DB2-BD59-A6C34878D82A}">
-                    <a16:rowId xmlns:a16="http://schemas.microsoft.com/office/drawing/2014/main" val="804198424"/>
-                  </a:ext>
-                </a:extLst>
-              </a:tr>
-              <a:tr h="354852">
-                <a:tc>
-                  <a:txBody>
-                    <a:bodyPr/>
-                    <a:lstStyle/>
-                    <a:p>
-                      <a:pPr marL="0" algn="ctr" defTabSz="914400" rtl="0" eaLnBrk="1" latinLnBrk="1" hangingPunct="1"/>
-                      <a:r>
-                        <a:rPr lang="en-US" sz="1200" b="1" kern="1200" dirty="0">
-                          <a:solidFill>
-                            <a:schemeClr val="lt1"/>
-                          </a:solidFill>
-                          <a:latin typeface="+mn-lt"/>
-                          <a:ea typeface="+mn-ea"/>
-                          <a:cs typeface="+mn-cs"/>
-                        </a:rPr>
-                        <a:t>weighted avg</a:t>
-                      </a:r>
-                    </a:p>
-                  </a:txBody>
-                  <a:tcPr anchor="ctr"/>
-                </a:tc>
-                <a:tc>
-                  <a:txBody>
-                    <a:bodyPr/>
-                    <a:lstStyle/>
-                    <a:p>
-                      <a:pPr algn="r"/>
-                      <a:r>
-                        <a:rPr lang="en-US" sz="1400" dirty="0"/>
-                        <a:t>1.00</a:t>
-                      </a:r>
-                    </a:p>
-                  </a:txBody>
-                  <a:tcPr anchor="ctr"/>
-                </a:tc>
-                <a:tc>
-                  <a:txBody>
-                    <a:bodyPr/>
-                    <a:lstStyle/>
-                    <a:p>
-                      <a:pPr algn="r"/>
-                      <a:r>
-                        <a:rPr lang="en-US" sz="1400" dirty="0"/>
-                        <a:t>0.98</a:t>
-                      </a:r>
-                    </a:p>
-                  </a:txBody>
-                  <a:tcPr anchor="ctr"/>
-                </a:tc>
-                <a:tc>
-                  <a:txBody>
-                    <a:bodyPr/>
-                    <a:lstStyle/>
-                    <a:p>
-                      <a:pPr algn="r"/>
-                      <a:r>
-                        <a:rPr lang="en-US" sz="1400" dirty="0"/>
-                        <a:t>0.99</a:t>
-                      </a:r>
-                    </a:p>
-                  </a:txBody>
-                  <a:tcPr anchor="ctr"/>
-                </a:tc>
-                <a:extLst>
-                  <a:ext uri="{0D108BD9-81ED-4DB2-BD59-A6C34878D82A}">
-                    <a16:rowId xmlns:a16="http://schemas.microsoft.com/office/drawing/2014/main" val="2396135537"/>
-                  </a:ext>
-                </a:extLst>
-              </a:tr>
-            </a:tbl>
-          </a:graphicData>
-        </a:graphic>
-      </p:graphicFrame>
-      <p:sp>
-        <p:nvSpPr>
-          <p:cNvPr id="8" name="Frame 7">
-            <a:extLst>
-              <a:ext uri="{FF2B5EF4-FFF2-40B4-BE49-F238E27FC236}">
-                <a16:creationId xmlns:a16="http://schemas.microsoft.com/office/drawing/2014/main" id="{15D5A841-CB4F-AD77-9904-6C84EBCEBE81}"/>
-              </a:ext>
-            </a:extLst>
-          </p:cNvPr>
-          <p:cNvSpPr/>
-          <p:nvPr/>
-        </p:nvSpPr>
-        <p:spPr>
-          <a:xfrm>
-            <a:off x="2975956" y="3624636"/>
-            <a:ext cx="1708558" cy="244296"/>
-          </a:xfrm>
-          <a:prstGeom prst="frame">
-            <a:avLst>
-              <a:gd name="adj1" fmla="val 4741"/>
-            </a:avLst>
-          </a:prstGeom>
-          <a:solidFill>
-            <a:srgbClr val="FF0000"/>
-          </a:solidFill>
-          <a:ln>
-            <a:noFill/>
-          </a:ln>
-        </p:spPr>
-        <p:style>
-          <a:lnRef idx="2">
-            <a:schemeClr val="accent1">
-              <a:shade val="50000"/>
-            </a:schemeClr>
-          </a:lnRef>
-          <a:fillRef idx="1">
-            <a:schemeClr val="accent1"/>
-          </a:fillRef>
-          <a:effectRef idx="0">
-            <a:schemeClr val="accent1"/>
-          </a:effectRef>
-          <a:fontRef idx="minor">
-            <a:schemeClr val="lt1"/>
-          </a:fontRef>
-        </p:style>
-        <p:txBody>
-          <a:bodyPr rtlCol="0" anchor="ctr"/>
-          <a:lstStyle/>
-          <a:p>
-            <a:pPr algn="ctr"/>
-            <a:endParaRPr lang="en-KR">
-              <a:solidFill>
-                <a:schemeClr val="tx1"/>
-              </a:solidFill>
-            </a:endParaRPr>
-          </a:p>
-        </p:txBody>
-      </p:sp>
-    </p:spTree>
-    <p:extLst>
-      <p:ext uri="{BB962C8B-B14F-4D97-AF65-F5344CB8AC3E}">
-        <p14:creationId xmlns:p14="http://schemas.microsoft.com/office/powerpoint/2010/main" val="2546290377"/>
-      </p:ext>
-    </p:extLst>
-  </p:cSld>
-  <p:clrMapOvr>
-    <a:masterClrMapping/>
-  </p:clrMapOvr>
-</p:sld>
-</file>
-
-<file path=ppt/slides/slide34.xml><?xml version="1.0" encoding="utf-8"?>
 <p:sld xmlns:a="http://schemas.openxmlformats.org/drawingml/2006/main" xmlns:r="http://schemas.openxmlformats.org/officeDocument/2006/relationships" xmlns:p="http://schemas.openxmlformats.org/presentationml/2006/main">
   <p:cSld>
     <p:spTree>
@@ -24126,7 +23272,1132 @@
 </p:sld>
 </file>
 
+<file path=ppt/slides/slide34.xml><?xml version="1.0" encoding="utf-8"?>
+<p:sld xmlns:a="http://schemas.openxmlformats.org/drawingml/2006/main" xmlns:r="http://schemas.openxmlformats.org/officeDocument/2006/relationships" xmlns:p="http://schemas.openxmlformats.org/presentationml/2006/main">
+  <p:cSld>
+    <p:spTree>
+      <p:nvGrpSpPr>
+        <p:cNvPr id="1" name=""/>
+        <p:cNvGrpSpPr/>
+        <p:nvPr/>
+      </p:nvGrpSpPr>
+      <p:grpSpPr>
+        <a:xfrm>
+          <a:off x="0" y="0"/>
+          <a:ext cx="0" cy="0"/>
+          <a:chOff x="0" y="0"/>
+          <a:chExt cx="0" cy="0"/>
+        </a:xfrm>
+      </p:grpSpPr>
+      <p:pic>
+        <p:nvPicPr>
+          <p:cNvPr id="1026" name="Picture 2">
+            <a:extLst>
+              <a:ext uri="{FF2B5EF4-FFF2-40B4-BE49-F238E27FC236}">
+                <a16:creationId xmlns:a16="http://schemas.microsoft.com/office/drawing/2014/main" id="{D1E515A9-2C16-F246-5426-83550E8B4E26}"/>
+              </a:ext>
+            </a:extLst>
+          </p:cNvPr>
+          <p:cNvPicPr>
+            <a:picLocks noChangeAspect="1" noChangeArrowheads="1"/>
+          </p:cNvPicPr>
+          <p:nvPr/>
+        </p:nvPicPr>
+        <p:blipFill>
+          <a:blip r:embed="rId2">
+            <a:extLst>
+              <a:ext uri="{28A0092B-C50C-407E-A947-70E740481C1C}">
+                <a14:useLocalDpi xmlns:a14="http://schemas.microsoft.com/office/drawing/2010/main" val="0"/>
+              </a:ext>
+            </a:extLst>
+          </a:blip>
+          <a:srcRect/>
+          <a:stretch>
+            <a:fillRect/>
+          </a:stretch>
+        </p:blipFill>
+        <p:spPr bwMode="auto">
+          <a:xfrm>
+            <a:off x="6428847" y="2346096"/>
+            <a:ext cx="5251441" cy="3949017"/>
+          </a:xfrm>
+          <a:prstGeom prst="rect">
+            <a:avLst/>
+          </a:prstGeom>
+          <a:noFill/>
+          <a:extLst>
+            <a:ext uri="{909E8E84-426E-40DD-AFC4-6F175D3DCCD1}">
+              <a14:hiddenFill xmlns:a14="http://schemas.microsoft.com/office/drawing/2010/main">
+                <a:solidFill>
+                  <a:srgbClr val="FFFFFF"/>
+                </a:solidFill>
+              </a14:hiddenFill>
+            </a:ext>
+          </a:extLst>
+        </p:spPr>
+      </p:pic>
+      <p:cxnSp>
+        <p:nvCxnSpPr>
+          <p:cNvPr id="3" name="직선 연결선 2"/>
+          <p:cNvCxnSpPr/>
+          <p:nvPr/>
+        </p:nvCxnSpPr>
+        <p:spPr>
+          <a:xfrm>
+            <a:off x="254000" y="362675"/>
+            <a:ext cx="11671300" cy="0"/>
+          </a:xfrm>
+          <a:prstGeom prst="line">
+            <a:avLst/>
+          </a:prstGeom>
+          <a:ln w="6350">
+            <a:solidFill>
+              <a:srgbClr val="4B5555"/>
+            </a:solidFill>
+          </a:ln>
+        </p:spPr>
+        <p:style>
+          <a:lnRef idx="1">
+            <a:schemeClr val="accent1"/>
+          </a:lnRef>
+          <a:fillRef idx="0">
+            <a:schemeClr val="accent1"/>
+          </a:fillRef>
+          <a:effectRef idx="0">
+            <a:schemeClr val="accent1"/>
+          </a:effectRef>
+          <a:fontRef idx="minor">
+            <a:schemeClr val="tx1"/>
+          </a:fontRef>
+        </p:style>
+      </p:cxnSp>
+      <p:sp>
+        <p:nvSpPr>
+          <p:cNvPr id="2" name="TextBox 1">
+            <a:extLst>
+              <a:ext uri="{FF2B5EF4-FFF2-40B4-BE49-F238E27FC236}">
+                <a16:creationId xmlns:a16="http://schemas.microsoft.com/office/drawing/2014/main" id="{B83E3735-A258-661D-A015-36D6B5886803}"/>
+              </a:ext>
+            </a:extLst>
+          </p:cNvPr>
+          <p:cNvSpPr txBox="1"/>
+          <p:nvPr/>
+        </p:nvSpPr>
+        <p:spPr>
+          <a:xfrm>
+            <a:off x="266700" y="0"/>
+            <a:ext cx="1350049" cy="400110"/>
+          </a:xfrm>
+          <a:prstGeom prst="rect">
+            <a:avLst/>
+          </a:prstGeom>
+          <a:noFill/>
+        </p:spPr>
+        <p:txBody>
+          <a:bodyPr wrap="none" rtlCol="0">
+            <a:spAutoFit/>
+          </a:bodyPr>
+          <a:lstStyle/>
+          <a:p>
+            <a:pPr algn="ctr"/>
+            <a:r>
+              <a:rPr lang="en-US" altLang="ko-KR" sz="2000" b="1" dirty="0">
+                <a:solidFill>
+                  <a:srgbClr val="4B5555"/>
+                </a:solidFill>
+                <a:latin typeface="나눔고딕" panose="020D0604000000000000" pitchFamily="50" charset="-127"/>
+                <a:ea typeface="나눔고딕" panose="020D0604000000000000" pitchFamily="50" charset="-127"/>
+              </a:rPr>
+              <a:t>MZ</a:t>
+            </a:r>
+            <a:r>
+              <a:rPr lang="ko-KR" altLang="en-US" sz="2000" b="1" dirty="0">
+                <a:solidFill>
+                  <a:srgbClr val="4B5555"/>
+                </a:solidFill>
+                <a:latin typeface="나눔고딕" panose="020D0604000000000000" pitchFamily="50" charset="-127"/>
+                <a:ea typeface="나눔고딕" panose="020D0604000000000000" pitchFamily="50" charset="-127"/>
+              </a:rPr>
+              <a:t> </a:t>
+            </a:r>
+            <a:r>
+              <a:rPr lang="en-US" altLang="ko-KR" sz="2000" b="1" dirty="0">
+                <a:solidFill>
+                  <a:srgbClr val="4B5555"/>
+                </a:solidFill>
+                <a:latin typeface="나눔고딕" panose="020D0604000000000000" pitchFamily="50" charset="-127"/>
+                <a:ea typeface="나눔고딕" panose="020D0604000000000000" pitchFamily="50" charset="-127"/>
+              </a:rPr>
+              <a:t>CARD</a:t>
+            </a:r>
+            <a:endParaRPr lang="ko-KR" altLang="en-US" sz="2400" b="1" dirty="0">
+              <a:solidFill>
+                <a:srgbClr val="1171A4"/>
+              </a:solidFill>
+              <a:latin typeface="나눔고딕" panose="020D0604000000000000" pitchFamily="50" charset="-127"/>
+              <a:ea typeface="나눔고딕" panose="020D0604000000000000" pitchFamily="50" charset="-127"/>
+            </a:endParaRPr>
+          </a:p>
+        </p:txBody>
+      </p:sp>
+      <p:sp>
+        <p:nvSpPr>
+          <p:cNvPr id="5" name="TextBox 4">
+            <a:extLst>
+              <a:ext uri="{FF2B5EF4-FFF2-40B4-BE49-F238E27FC236}">
+                <a16:creationId xmlns:a16="http://schemas.microsoft.com/office/drawing/2014/main" id="{A0E380EB-5AEA-7826-3418-B45EA28E6AD7}"/>
+              </a:ext>
+            </a:extLst>
+          </p:cNvPr>
+          <p:cNvSpPr txBox="1"/>
+          <p:nvPr/>
+        </p:nvSpPr>
+        <p:spPr>
+          <a:xfrm>
+            <a:off x="511712" y="1154331"/>
+            <a:ext cx="11015270" cy="400110"/>
+          </a:xfrm>
+          <a:prstGeom prst="rect">
+            <a:avLst/>
+          </a:prstGeom>
+          <a:noFill/>
+        </p:spPr>
+        <p:txBody>
+          <a:bodyPr wrap="square" rtlCol="0">
+            <a:spAutoFit/>
+          </a:bodyPr>
+          <a:lstStyle/>
+          <a:p>
+            <a:r>
+              <a:rPr lang="ko-KR" altLang="en-US" sz="2000" b="1" dirty="0">
+                <a:solidFill>
+                  <a:srgbClr val="4B5555"/>
+                </a:solidFill>
+                <a:latin typeface="나눔고딕" panose="020D0604000000000000" pitchFamily="50" charset="-127"/>
+                <a:ea typeface="나눔고딕" panose="020D0604000000000000" pitchFamily="50" charset="-127"/>
+              </a:rPr>
+              <a:t>최적 </a:t>
+            </a:r>
+            <a:r>
+              <a:rPr lang="en-US" altLang="ko-KR" sz="2000" b="1" dirty="0">
+                <a:solidFill>
+                  <a:srgbClr val="4B5555"/>
+                </a:solidFill>
+                <a:latin typeface="나눔고딕" panose="020D0604000000000000" pitchFamily="50" charset="-127"/>
+                <a:ea typeface="나눔고딕" panose="020D0604000000000000" pitchFamily="50" charset="-127"/>
+              </a:rPr>
+              <a:t>Hyperparameters </a:t>
+            </a:r>
+            <a:r>
+              <a:rPr lang="ko-KR" altLang="en-US" sz="2000" b="1" dirty="0">
+                <a:solidFill>
+                  <a:srgbClr val="4B5555"/>
+                </a:solidFill>
+                <a:latin typeface="나눔고딕" panose="020D0604000000000000" pitchFamily="50" charset="-127"/>
+                <a:ea typeface="나눔고딕" panose="020D0604000000000000" pitchFamily="50" charset="-127"/>
+              </a:rPr>
+              <a:t>이용한 테스트 데이터 예측 </a:t>
+            </a:r>
+            <a:r>
+              <a:rPr lang="en-US" altLang="ko-KR" sz="2000" b="1" dirty="0">
+                <a:solidFill>
+                  <a:srgbClr val="4B5555"/>
+                </a:solidFill>
+                <a:latin typeface="나눔고딕" panose="020D0604000000000000" pitchFamily="50" charset="-127"/>
+                <a:ea typeface="나눔고딕" panose="020D0604000000000000" pitchFamily="50" charset="-127"/>
+              </a:rPr>
+              <a:t>(</a:t>
+            </a:r>
+            <a:r>
+              <a:rPr lang="ko-KR" altLang="en-US" sz="2000" b="1" dirty="0" err="1">
+                <a:solidFill>
+                  <a:srgbClr val="4B5555"/>
+                </a:solidFill>
+                <a:latin typeface="나눔고딕" panose="020D0604000000000000" pitchFamily="50" charset="-127"/>
+                <a:ea typeface="나눔고딕" panose="020D0604000000000000" pitchFamily="50" charset="-127"/>
+              </a:rPr>
+              <a:t>언더샘플링</a:t>
+            </a:r>
+            <a:r>
+              <a:rPr lang="ko-KR" altLang="en-US" sz="2000" b="1" dirty="0">
+                <a:solidFill>
+                  <a:srgbClr val="4B5555"/>
+                </a:solidFill>
+                <a:latin typeface="나눔고딕" panose="020D0604000000000000" pitchFamily="50" charset="-127"/>
+                <a:ea typeface="나눔고딕" panose="020D0604000000000000" pitchFamily="50" charset="-127"/>
+              </a:rPr>
+              <a:t> 데이터로 학습한 모델 이용</a:t>
+            </a:r>
+            <a:r>
+              <a:rPr lang="en-US" altLang="ko-KR" sz="2000" b="1" dirty="0">
+                <a:solidFill>
+                  <a:srgbClr val="4B5555"/>
+                </a:solidFill>
+                <a:latin typeface="나눔고딕" panose="020D0604000000000000" pitchFamily="50" charset="-127"/>
+                <a:ea typeface="나눔고딕" panose="020D0604000000000000" pitchFamily="50" charset="-127"/>
+              </a:rPr>
+              <a:t>)</a:t>
+            </a:r>
+            <a:endParaRPr lang="ko-KR" altLang="en-US" sz="2400" b="1" dirty="0">
+              <a:solidFill>
+                <a:srgbClr val="1171A4"/>
+              </a:solidFill>
+              <a:latin typeface="나눔고딕" panose="020D0604000000000000" pitchFamily="50" charset="-127"/>
+              <a:ea typeface="나눔고딕" panose="020D0604000000000000" pitchFamily="50" charset="-127"/>
+            </a:endParaRPr>
+          </a:p>
+        </p:txBody>
+      </p:sp>
+      <p:sp>
+        <p:nvSpPr>
+          <p:cNvPr id="11" name="TextBox 10">
+            <a:extLst>
+              <a:ext uri="{FF2B5EF4-FFF2-40B4-BE49-F238E27FC236}">
+                <a16:creationId xmlns:a16="http://schemas.microsoft.com/office/drawing/2014/main" id="{6B287F43-05E7-F9C8-9D59-1E9EA41EFBC6}"/>
+              </a:ext>
+            </a:extLst>
+          </p:cNvPr>
+          <p:cNvSpPr txBox="1"/>
+          <p:nvPr/>
+        </p:nvSpPr>
+        <p:spPr>
+          <a:xfrm>
+            <a:off x="511713" y="508000"/>
+            <a:ext cx="1053494" cy="646331"/>
+          </a:xfrm>
+          <a:prstGeom prst="rect">
+            <a:avLst/>
+          </a:prstGeom>
+          <a:noFill/>
+        </p:spPr>
+        <p:txBody>
+          <a:bodyPr wrap="none" rtlCol="0">
+            <a:spAutoFit/>
+          </a:bodyPr>
+          <a:lstStyle/>
+          <a:p>
+            <a:r>
+              <a:rPr lang="ko-KR" altLang="en-US" sz="3600" b="1" dirty="0">
+                <a:solidFill>
+                  <a:srgbClr val="1171A4"/>
+                </a:solidFill>
+                <a:latin typeface="나눔고딕" panose="020D0604000000000000" pitchFamily="50" charset="-127"/>
+                <a:ea typeface="나눔고딕" panose="020D0604000000000000" pitchFamily="50" charset="-127"/>
+              </a:rPr>
+              <a:t>결과</a:t>
+            </a:r>
+          </a:p>
+        </p:txBody>
+      </p:sp>
+      <p:graphicFrame>
+        <p:nvGraphicFramePr>
+          <p:cNvPr id="4" name="Table 6">
+            <a:extLst>
+              <a:ext uri="{FF2B5EF4-FFF2-40B4-BE49-F238E27FC236}">
+                <a16:creationId xmlns:a16="http://schemas.microsoft.com/office/drawing/2014/main" id="{E1CB77EF-B8F5-C130-8F3A-0A11EEB3C0FC}"/>
+              </a:ext>
+            </a:extLst>
+          </p:cNvPr>
+          <p:cNvGraphicFramePr>
+            <a:graphicFrameLocks noGrp="1"/>
+          </p:cNvGraphicFramePr>
+          <p:nvPr>
+            <p:extLst>
+              <p:ext uri="{D42A27DB-BD31-4B8C-83A1-F6EECF244321}">
+                <p14:modId xmlns:p14="http://schemas.microsoft.com/office/powerpoint/2010/main" val="1010650250"/>
+              </p:ext>
+            </p:extLst>
+          </p:nvPr>
+        </p:nvGraphicFramePr>
+        <p:xfrm>
+          <a:off x="1064029" y="2849059"/>
+          <a:ext cx="4893428" cy="2140020"/>
+        </p:xfrm>
+        <a:graphic>
+          <a:graphicData uri="http://schemas.openxmlformats.org/drawingml/2006/table">
+            <a:tbl>
+              <a:tblPr firstRow="1" firstCol="1" bandRow="1">
+                <a:tableStyleId>{7DF18680-E054-41AD-8BC1-D1AEF772440D}</a:tableStyleId>
+              </a:tblPr>
+              <a:tblGrid>
+                <a:gridCol w="1223357">
+                  <a:extLst>
+                    <a:ext uri="{9D8B030D-6E8A-4147-A177-3AD203B41FA5}">
+                      <a16:colId xmlns:a16="http://schemas.microsoft.com/office/drawing/2014/main" val="1625168884"/>
+                    </a:ext>
+                  </a:extLst>
+                </a:gridCol>
+                <a:gridCol w="1223357">
+                  <a:extLst>
+                    <a:ext uri="{9D8B030D-6E8A-4147-A177-3AD203B41FA5}">
+                      <a16:colId xmlns:a16="http://schemas.microsoft.com/office/drawing/2014/main" val="2651069430"/>
+                    </a:ext>
+                  </a:extLst>
+                </a:gridCol>
+                <a:gridCol w="1223357">
+                  <a:extLst>
+                    <a:ext uri="{9D8B030D-6E8A-4147-A177-3AD203B41FA5}">
+                      <a16:colId xmlns:a16="http://schemas.microsoft.com/office/drawing/2014/main" val="1866455031"/>
+                    </a:ext>
+                  </a:extLst>
+                </a:gridCol>
+                <a:gridCol w="1223357">
+                  <a:extLst>
+                    <a:ext uri="{9D8B030D-6E8A-4147-A177-3AD203B41FA5}">
+                      <a16:colId xmlns:a16="http://schemas.microsoft.com/office/drawing/2014/main" val="2199166166"/>
+                    </a:ext>
+                  </a:extLst>
+                </a:gridCol>
+              </a:tblGrid>
+              <a:tr h="354852">
+                <a:tc>
+                  <a:txBody>
+                    <a:bodyPr/>
+                    <a:lstStyle/>
+                    <a:p>
+                      <a:endParaRPr lang="en-US" dirty="0"/>
+                    </a:p>
+                  </a:txBody>
+                  <a:tcPr/>
+                </a:tc>
+                <a:tc>
+                  <a:txBody>
+                    <a:bodyPr/>
+                    <a:lstStyle/>
+                    <a:p>
+                      <a:pPr algn="ctr"/>
+                      <a:r>
+                        <a:rPr lang="en-US" sz="1200" dirty="0"/>
+                        <a:t>precision</a:t>
+                      </a:r>
+                    </a:p>
+                  </a:txBody>
+                  <a:tcPr anchor="ctr"/>
+                </a:tc>
+                <a:tc>
+                  <a:txBody>
+                    <a:bodyPr/>
+                    <a:lstStyle/>
+                    <a:p>
+                      <a:pPr algn="ctr"/>
+                      <a:r>
+                        <a:rPr lang="en-US" sz="1200" dirty="0"/>
+                        <a:t>recall</a:t>
+                      </a:r>
+                    </a:p>
+                  </a:txBody>
+                  <a:tcPr anchor="ctr"/>
+                </a:tc>
+                <a:tc>
+                  <a:txBody>
+                    <a:bodyPr/>
+                    <a:lstStyle/>
+                    <a:p>
+                      <a:pPr algn="ctr"/>
+                      <a:r>
+                        <a:rPr lang="en-US" sz="1200" dirty="0"/>
+                        <a:t>F1-score</a:t>
+                      </a:r>
+                    </a:p>
+                  </a:txBody>
+                  <a:tcPr anchor="ctr"/>
+                </a:tc>
+                <a:extLst>
+                  <a:ext uri="{0D108BD9-81ED-4DB2-BD59-A6C34878D82A}">
+                    <a16:rowId xmlns:a16="http://schemas.microsoft.com/office/drawing/2014/main" val="1646888325"/>
+                  </a:ext>
+                </a:extLst>
+              </a:tr>
+              <a:tr h="354852">
+                <a:tc>
+                  <a:txBody>
+                    <a:bodyPr/>
+                    <a:lstStyle/>
+                    <a:p>
+                      <a:pPr marL="0" algn="ctr" defTabSz="914400" rtl="0" eaLnBrk="1" latinLnBrk="1" hangingPunct="1"/>
+                      <a:r>
+                        <a:rPr lang="en-US" sz="1200" b="1" kern="1200" dirty="0">
+                          <a:solidFill>
+                            <a:schemeClr val="lt1"/>
+                          </a:solidFill>
+                          <a:latin typeface="+mn-lt"/>
+                          <a:ea typeface="+mn-ea"/>
+                          <a:cs typeface="+mn-cs"/>
+                        </a:rPr>
+                        <a:t>0</a:t>
+                      </a:r>
+                    </a:p>
+                  </a:txBody>
+                  <a:tcPr anchor="ctr"/>
+                </a:tc>
+                <a:tc>
+                  <a:txBody>
+                    <a:bodyPr/>
+                    <a:lstStyle/>
+                    <a:p>
+                      <a:pPr algn="r"/>
+                      <a:r>
+                        <a:rPr lang="en-US" sz="1400" dirty="0"/>
+                        <a:t>1.00</a:t>
+                      </a:r>
+                    </a:p>
+                  </a:txBody>
+                  <a:tcPr anchor="ctr"/>
+                </a:tc>
+                <a:tc>
+                  <a:txBody>
+                    <a:bodyPr/>
+                    <a:lstStyle/>
+                    <a:p>
+                      <a:pPr algn="r"/>
+                      <a:r>
+                        <a:rPr lang="en-US" sz="1400" dirty="0"/>
+                        <a:t>0.98</a:t>
+                      </a:r>
+                    </a:p>
+                  </a:txBody>
+                  <a:tcPr anchor="ctr"/>
+                </a:tc>
+                <a:tc>
+                  <a:txBody>
+                    <a:bodyPr/>
+                    <a:lstStyle/>
+                    <a:p>
+                      <a:pPr algn="r"/>
+                      <a:r>
+                        <a:rPr lang="en-US" sz="1400" dirty="0"/>
+                        <a:t>0.99</a:t>
+                      </a:r>
+                    </a:p>
+                  </a:txBody>
+                  <a:tcPr anchor="ctr"/>
+                </a:tc>
+                <a:extLst>
+                  <a:ext uri="{0D108BD9-81ED-4DB2-BD59-A6C34878D82A}">
+                    <a16:rowId xmlns:a16="http://schemas.microsoft.com/office/drawing/2014/main" val="3607368520"/>
+                  </a:ext>
+                </a:extLst>
+              </a:tr>
+              <a:tr h="354852">
+                <a:tc>
+                  <a:txBody>
+                    <a:bodyPr/>
+                    <a:lstStyle/>
+                    <a:p>
+                      <a:pPr marL="0" algn="ctr" defTabSz="914400" rtl="0" eaLnBrk="1" latinLnBrk="1" hangingPunct="1"/>
+                      <a:r>
+                        <a:rPr lang="en-US" sz="1200" b="1" kern="1200" dirty="0">
+                          <a:solidFill>
+                            <a:schemeClr val="lt1"/>
+                          </a:solidFill>
+                          <a:latin typeface="+mn-lt"/>
+                          <a:ea typeface="+mn-ea"/>
+                          <a:cs typeface="+mn-cs"/>
+                        </a:rPr>
+                        <a:t>1</a:t>
+                      </a:r>
+                    </a:p>
+                  </a:txBody>
+                  <a:tcPr anchor="ctr"/>
+                </a:tc>
+                <a:tc>
+                  <a:txBody>
+                    <a:bodyPr/>
+                    <a:lstStyle/>
+                    <a:p>
+                      <a:pPr algn="r"/>
+                      <a:r>
+                        <a:rPr lang="en-US" sz="1400" dirty="0"/>
+                        <a:t>0.15</a:t>
+                      </a:r>
+                    </a:p>
+                  </a:txBody>
+                  <a:tcPr anchor="ctr"/>
+                </a:tc>
+                <a:tc>
+                  <a:txBody>
+                    <a:bodyPr/>
+                    <a:lstStyle/>
+                    <a:p>
+                      <a:pPr algn="r"/>
+                      <a:r>
+                        <a:rPr lang="en-US" sz="1400" dirty="0"/>
+                        <a:t>0.97</a:t>
+                      </a:r>
+                    </a:p>
+                  </a:txBody>
+                  <a:tcPr anchor="ctr"/>
+                </a:tc>
+                <a:tc>
+                  <a:txBody>
+                    <a:bodyPr/>
+                    <a:lstStyle/>
+                    <a:p>
+                      <a:pPr algn="r"/>
+                      <a:r>
+                        <a:rPr lang="en-US" sz="1400" dirty="0"/>
+                        <a:t>0.26</a:t>
+                      </a:r>
+                    </a:p>
+                  </a:txBody>
+                  <a:tcPr anchor="ctr"/>
+                </a:tc>
+                <a:extLst>
+                  <a:ext uri="{0D108BD9-81ED-4DB2-BD59-A6C34878D82A}">
+                    <a16:rowId xmlns:a16="http://schemas.microsoft.com/office/drawing/2014/main" val="1182080453"/>
+                  </a:ext>
+                </a:extLst>
+              </a:tr>
+              <a:tr h="354852">
+                <a:tc>
+                  <a:txBody>
+                    <a:bodyPr/>
+                    <a:lstStyle/>
+                    <a:p>
+                      <a:pPr marL="0" algn="ctr" defTabSz="914400" rtl="0" eaLnBrk="1" latinLnBrk="1" hangingPunct="1"/>
+                      <a:r>
+                        <a:rPr lang="en-US" sz="1200" b="1" kern="1200" dirty="0">
+                          <a:solidFill>
+                            <a:schemeClr val="lt1"/>
+                          </a:solidFill>
+                          <a:latin typeface="+mn-lt"/>
+                          <a:ea typeface="+mn-ea"/>
+                          <a:cs typeface="+mn-cs"/>
+                        </a:rPr>
+                        <a:t>accuracy</a:t>
+                      </a:r>
+                    </a:p>
+                  </a:txBody>
+                  <a:tcPr anchor="ctr"/>
+                </a:tc>
+                <a:tc>
+                  <a:txBody>
+                    <a:bodyPr/>
+                    <a:lstStyle/>
+                    <a:p>
+                      <a:pPr algn="r"/>
+                      <a:endParaRPr lang="en-US" sz="1400" dirty="0"/>
+                    </a:p>
+                  </a:txBody>
+                  <a:tcPr anchor="ctr"/>
+                </a:tc>
+                <a:tc>
+                  <a:txBody>
+                    <a:bodyPr/>
+                    <a:lstStyle/>
+                    <a:p>
+                      <a:pPr algn="r"/>
+                      <a:endParaRPr lang="en-US" sz="1400" dirty="0"/>
+                    </a:p>
+                  </a:txBody>
+                  <a:tcPr anchor="ctr"/>
+                </a:tc>
+                <a:tc>
+                  <a:txBody>
+                    <a:bodyPr/>
+                    <a:lstStyle/>
+                    <a:p>
+                      <a:pPr algn="r"/>
+                      <a:r>
+                        <a:rPr lang="en-US" sz="1400" dirty="0"/>
+                        <a:t>0.98</a:t>
+                      </a:r>
+                    </a:p>
+                  </a:txBody>
+                  <a:tcPr anchor="ctr"/>
+                </a:tc>
+                <a:extLst>
+                  <a:ext uri="{0D108BD9-81ED-4DB2-BD59-A6C34878D82A}">
+                    <a16:rowId xmlns:a16="http://schemas.microsoft.com/office/drawing/2014/main" val="2581843712"/>
+                  </a:ext>
+                </a:extLst>
+              </a:tr>
+              <a:tr h="354852">
+                <a:tc>
+                  <a:txBody>
+                    <a:bodyPr/>
+                    <a:lstStyle/>
+                    <a:p>
+                      <a:pPr marL="0" algn="ctr" defTabSz="914400" rtl="0" eaLnBrk="1" latinLnBrk="1" hangingPunct="1"/>
+                      <a:r>
+                        <a:rPr lang="en-US" sz="1200" b="1" kern="1200" dirty="0">
+                          <a:solidFill>
+                            <a:schemeClr val="lt1"/>
+                          </a:solidFill>
+                          <a:latin typeface="+mn-lt"/>
+                          <a:ea typeface="+mn-ea"/>
+                          <a:cs typeface="+mn-cs"/>
+                        </a:rPr>
+                        <a:t>macro avg</a:t>
+                      </a:r>
+                    </a:p>
+                  </a:txBody>
+                  <a:tcPr anchor="ctr"/>
+                </a:tc>
+                <a:tc>
+                  <a:txBody>
+                    <a:bodyPr/>
+                    <a:lstStyle/>
+                    <a:p>
+                      <a:pPr algn="r"/>
+                      <a:r>
+                        <a:rPr lang="en-US" sz="1400" dirty="0"/>
+                        <a:t>0.57</a:t>
+                      </a:r>
+                    </a:p>
+                  </a:txBody>
+                  <a:tcPr anchor="ctr"/>
+                </a:tc>
+                <a:tc>
+                  <a:txBody>
+                    <a:bodyPr/>
+                    <a:lstStyle/>
+                    <a:p>
+                      <a:pPr algn="r"/>
+                      <a:r>
+                        <a:rPr lang="en-US" sz="1400" dirty="0"/>
+                        <a:t>0.98</a:t>
+                      </a:r>
+                    </a:p>
+                  </a:txBody>
+                  <a:tcPr anchor="ctr"/>
+                </a:tc>
+                <a:tc>
+                  <a:txBody>
+                    <a:bodyPr/>
+                    <a:lstStyle/>
+                    <a:p>
+                      <a:pPr algn="r"/>
+                      <a:r>
+                        <a:rPr lang="en-US" sz="1400" dirty="0"/>
+                        <a:t>0.62</a:t>
+                      </a:r>
+                    </a:p>
+                  </a:txBody>
+                  <a:tcPr anchor="ctr"/>
+                </a:tc>
+                <a:extLst>
+                  <a:ext uri="{0D108BD9-81ED-4DB2-BD59-A6C34878D82A}">
+                    <a16:rowId xmlns:a16="http://schemas.microsoft.com/office/drawing/2014/main" val="804198424"/>
+                  </a:ext>
+                </a:extLst>
+              </a:tr>
+              <a:tr h="354852">
+                <a:tc>
+                  <a:txBody>
+                    <a:bodyPr/>
+                    <a:lstStyle/>
+                    <a:p>
+                      <a:pPr marL="0" algn="ctr" defTabSz="914400" rtl="0" eaLnBrk="1" latinLnBrk="1" hangingPunct="1"/>
+                      <a:r>
+                        <a:rPr lang="en-US" sz="1200" b="1" kern="1200" dirty="0">
+                          <a:solidFill>
+                            <a:schemeClr val="lt1"/>
+                          </a:solidFill>
+                          <a:latin typeface="+mn-lt"/>
+                          <a:ea typeface="+mn-ea"/>
+                          <a:cs typeface="+mn-cs"/>
+                        </a:rPr>
+                        <a:t>weighted avg</a:t>
+                      </a:r>
+                    </a:p>
+                  </a:txBody>
+                  <a:tcPr anchor="ctr"/>
+                </a:tc>
+                <a:tc>
+                  <a:txBody>
+                    <a:bodyPr/>
+                    <a:lstStyle/>
+                    <a:p>
+                      <a:pPr algn="r"/>
+                      <a:r>
+                        <a:rPr lang="en-US" sz="1400" dirty="0"/>
+                        <a:t>1.00</a:t>
+                      </a:r>
+                    </a:p>
+                  </a:txBody>
+                  <a:tcPr anchor="ctr"/>
+                </a:tc>
+                <a:tc>
+                  <a:txBody>
+                    <a:bodyPr/>
+                    <a:lstStyle/>
+                    <a:p>
+                      <a:pPr algn="r"/>
+                      <a:r>
+                        <a:rPr lang="en-US" sz="1400" dirty="0"/>
+                        <a:t>0.98</a:t>
+                      </a:r>
+                    </a:p>
+                  </a:txBody>
+                  <a:tcPr anchor="ctr"/>
+                </a:tc>
+                <a:tc>
+                  <a:txBody>
+                    <a:bodyPr/>
+                    <a:lstStyle/>
+                    <a:p>
+                      <a:pPr algn="r"/>
+                      <a:r>
+                        <a:rPr lang="en-US" sz="1400" dirty="0"/>
+                        <a:t>0.99</a:t>
+                      </a:r>
+                    </a:p>
+                  </a:txBody>
+                  <a:tcPr anchor="ctr"/>
+                </a:tc>
+                <a:extLst>
+                  <a:ext uri="{0D108BD9-81ED-4DB2-BD59-A6C34878D82A}">
+                    <a16:rowId xmlns:a16="http://schemas.microsoft.com/office/drawing/2014/main" val="2396135537"/>
+                  </a:ext>
+                </a:extLst>
+              </a:tr>
+            </a:tbl>
+          </a:graphicData>
+        </a:graphic>
+      </p:graphicFrame>
+      <p:sp>
+        <p:nvSpPr>
+          <p:cNvPr id="8" name="Frame 7">
+            <a:extLst>
+              <a:ext uri="{FF2B5EF4-FFF2-40B4-BE49-F238E27FC236}">
+                <a16:creationId xmlns:a16="http://schemas.microsoft.com/office/drawing/2014/main" id="{15D5A841-CB4F-AD77-9904-6C84EBCEBE81}"/>
+              </a:ext>
+            </a:extLst>
+          </p:cNvPr>
+          <p:cNvSpPr/>
+          <p:nvPr/>
+        </p:nvSpPr>
+        <p:spPr>
+          <a:xfrm>
+            <a:off x="2975956" y="3624636"/>
+            <a:ext cx="1708558" cy="244296"/>
+          </a:xfrm>
+          <a:prstGeom prst="frame">
+            <a:avLst>
+              <a:gd name="adj1" fmla="val 4741"/>
+            </a:avLst>
+          </a:prstGeom>
+          <a:solidFill>
+            <a:srgbClr val="FF0000"/>
+          </a:solidFill>
+          <a:ln>
+            <a:noFill/>
+          </a:ln>
+        </p:spPr>
+        <p:style>
+          <a:lnRef idx="2">
+            <a:schemeClr val="accent1">
+              <a:shade val="50000"/>
+            </a:schemeClr>
+          </a:lnRef>
+          <a:fillRef idx="1">
+            <a:schemeClr val="accent1"/>
+          </a:fillRef>
+          <a:effectRef idx="0">
+            <a:schemeClr val="accent1"/>
+          </a:effectRef>
+          <a:fontRef idx="minor">
+            <a:schemeClr val="lt1"/>
+          </a:fontRef>
+        </p:style>
+        <p:txBody>
+          <a:bodyPr rtlCol="0" anchor="ctr"/>
+          <a:lstStyle/>
+          <a:p>
+            <a:pPr algn="ctr"/>
+            <a:endParaRPr lang="en-KR">
+              <a:solidFill>
+                <a:schemeClr val="tx1"/>
+              </a:solidFill>
+            </a:endParaRPr>
+          </a:p>
+        </p:txBody>
+      </p:sp>
+    </p:spTree>
+    <p:extLst>
+      <p:ext uri="{BB962C8B-B14F-4D97-AF65-F5344CB8AC3E}">
+        <p14:creationId xmlns:p14="http://schemas.microsoft.com/office/powerpoint/2010/main" val="2546290377"/>
+      </p:ext>
+    </p:extLst>
+  </p:cSld>
+  <p:clrMapOvr>
+    <a:masterClrMapping/>
+  </p:clrMapOvr>
+</p:sld>
+</file>
+
 <file path=ppt/slides/slide35.xml><?xml version="1.0" encoding="utf-8"?>
+<p:sld xmlns:a="http://schemas.openxmlformats.org/drawingml/2006/main" xmlns:r="http://schemas.openxmlformats.org/officeDocument/2006/relationships" xmlns:p="http://schemas.openxmlformats.org/presentationml/2006/main">
+  <p:cSld>
+    <p:spTree>
+      <p:nvGrpSpPr>
+        <p:cNvPr id="1" name=""/>
+        <p:cNvGrpSpPr/>
+        <p:nvPr/>
+      </p:nvGrpSpPr>
+      <p:grpSpPr>
+        <a:xfrm>
+          <a:off x="0" y="0"/>
+          <a:ext cx="0" cy="0"/>
+          <a:chOff x="0" y="0"/>
+          <a:chExt cx="0" cy="0"/>
+        </a:xfrm>
+      </p:grpSpPr>
+      <p:cxnSp>
+        <p:nvCxnSpPr>
+          <p:cNvPr id="3" name="직선 연결선 2"/>
+          <p:cNvCxnSpPr/>
+          <p:nvPr/>
+        </p:nvCxnSpPr>
+        <p:spPr>
+          <a:xfrm>
+            <a:off x="254000" y="362675"/>
+            <a:ext cx="11671300" cy="0"/>
+          </a:xfrm>
+          <a:prstGeom prst="line">
+            <a:avLst/>
+          </a:prstGeom>
+          <a:ln w="6350">
+            <a:solidFill>
+              <a:srgbClr val="4B5555"/>
+            </a:solidFill>
+          </a:ln>
+        </p:spPr>
+        <p:style>
+          <a:lnRef idx="1">
+            <a:schemeClr val="accent1"/>
+          </a:lnRef>
+          <a:fillRef idx="0">
+            <a:schemeClr val="accent1"/>
+          </a:fillRef>
+          <a:effectRef idx="0">
+            <a:schemeClr val="accent1"/>
+          </a:effectRef>
+          <a:fontRef idx="minor">
+            <a:schemeClr val="tx1"/>
+          </a:fontRef>
+        </p:style>
+      </p:cxnSp>
+      <p:sp>
+        <p:nvSpPr>
+          <p:cNvPr id="2" name="TextBox 1">
+            <a:extLst>
+              <a:ext uri="{FF2B5EF4-FFF2-40B4-BE49-F238E27FC236}">
+                <a16:creationId xmlns:a16="http://schemas.microsoft.com/office/drawing/2014/main" id="{B83E3735-A258-661D-A015-36D6B5886803}"/>
+              </a:ext>
+            </a:extLst>
+          </p:cNvPr>
+          <p:cNvSpPr txBox="1"/>
+          <p:nvPr/>
+        </p:nvSpPr>
+        <p:spPr>
+          <a:xfrm>
+            <a:off x="266700" y="0"/>
+            <a:ext cx="1350049" cy="400110"/>
+          </a:xfrm>
+          <a:prstGeom prst="rect">
+            <a:avLst/>
+          </a:prstGeom>
+          <a:noFill/>
+        </p:spPr>
+        <p:txBody>
+          <a:bodyPr wrap="none" rtlCol="0">
+            <a:spAutoFit/>
+          </a:bodyPr>
+          <a:lstStyle/>
+          <a:p>
+            <a:pPr algn="ctr"/>
+            <a:r>
+              <a:rPr lang="en-US" altLang="ko-KR" sz="2000" b="1" dirty="0">
+                <a:solidFill>
+                  <a:srgbClr val="4B5555"/>
+                </a:solidFill>
+                <a:latin typeface="나눔고딕" panose="020D0604000000000000" pitchFamily="50" charset="-127"/>
+                <a:ea typeface="나눔고딕" panose="020D0604000000000000" pitchFamily="50" charset="-127"/>
+              </a:rPr>
+              <a:t>MZ</a:t>
+            </a:r>
+            <a:r>
+              <a:rPr lang="ko-KR" altLang="en-US" sz="2000" b="1" dirty="0">
+                <a:solidFill>
+                  <a:srgbClr val="4B5555"/>
+                </a:solidFill>
+                <a:latin typeface="나눔고딕" panose="020D0604000000000000" pitchFamily="50" charset="-127"/>
+                <a:ea typeface="나눔고딕" panose="020D0604000000000000" pitchFamily="50" charset="-127"/>
+              </a:rPr>
+              <a:t> </a:t>
+            </a:r>
+            <a:r>
+              <a:rPr lang="en-US" altLang="ko-KR" sz="2000" b="1" dirty="0">
+                <a:solidFill>
+                  <a:srgbClr val="4B5555"/>
+                </a:solidFill>
+                <a:latin typeface="나눔고딕" panose="020D0604000000000000" pitchFamily="50" charset="-127"/>
+                <a:ea typeface="나눔고딕" panose="020D0604000000000000" pitchFamily="50" charset="-127"/>
+              </a:rPr>
+              <a:t>CARD</a:t>
+            </a:r>
+            <a:endParaRPr lang="ko-KR" altLang="en-US" sz="2400" b="1" dirty="0">
+              <a:solidFill>
+                <a:srgbClr val="1171A4"/>
+              </a:solidFill>
+              <a:latin typeface="나눔고딕" panose="020D0604000000000000" pitchFamily="50" charset="-127"/>
+              <a:ea typeface="나눔고딕" panose="020D0604000000000000" pitchFamily="50" charset="-127"/>
+            </a:endParaRPr>
+          </a:p>
+        </p:txBody>
+      </p:sp>
+      <p:sp>
+        <p:nvSpPr>
+          <p:cNvPr id="5" name="TextBox 4">
+            <a:extLst>
+              <a:ext uri="{FF2B5EF4-FFF2-40B4-BE49-F238E27FC236}">
+                <a16:creationId xmlns:a16="http://schemas.microsoft.com/office/drawing/2014/main" id="{A0E380EB-5AEA-7826-3418-B45EA28E6AD7}"/>
+              </a:ext>
+            </a:extLst>
+          </p:cNvPr>
+          <p:cNvSpPr txBox="1"/>
+          <p:nvPr/>
+        </p:nvSpPr>
+        <p:spPr>
+          <a:xfrm>
+            <a:off x="511712" y="1154331"/>
+            <a:ext cx="11015270" cy="400110"/>
+          </a:xfrm>
+          <a:prstGeom prst="rect">
+            <a:avLst/>
+          </a:prstGeom>
+          <a:noFill/>
+        </p:spPr>
+        <p:txBody>
+          <a:bodyPr wrap="square" rtlCol="0">
+            <a:spAutoFit/>
+          </a:bodyPr>
+          <a:lstStyle/>
+          <a:p>
+            <a:r>
+              <a:rPr lang="en-US" altLang="ko-KR" sz="2000" b="1" dirty="0">
+                <a:solidFill>
+                  <a:srgbClr val="4B5555"/>
+                </a:solidFill>
+                <a:latin typeface="나눔고딕" panose="020D0604000000000000" pitchFamily="50" charset="-127"/>
+                <a:ea typeface="나눔고딕" panose="020D0604000000000000" pitchFamily="50" charset="-127"/>
+              </a:rPr>
+              <a:t>Feature Importance</a:t>
+            </a:r>
+            <a:endParaRPr lang="ko-KR" altLang="en-US" sz="2400" b="1" dirty="0">
+              <a:solidFill>
+                <a:srgbClr val="1171A4"/>
+              </a:solidFill>
+              <a:latin typeface="나눔고딕" panose="020D0604000000000000" pitchFamily="50" charset="-127"/>
+              <a:ea typeface="나눔고딕" panose="020D0604000000000000" pitchFamily="50" charset="-127"/>
+            </a:endParaRPr>
+          </a:p>
+        </p:txBody>
+      </p:sp>
+      <p:sp>
+        <p:nvSpPr>
+          <p:cNvPr id="11" name="TextBox 10">
+            <a:extLst>
+              <a:ext uri="{FF2B5EF4-FFF2-40B4-BE49-F238E27FC236}">
+                <a16:creationId xmlns:a16="http://schemas.microsoft.com/office/drawing/2014/main" id="{6B287F43-05E7-F9C8-9D59-1E9EA41EFBC6}"/>
+              </a:ext>
+            </a:extLst>
+          </p:cNvPr>
+          <p:cNvSpPr txBox="1"/>
+          <p:nvPr/>
+        </p:nvSpPr>
+        <p:spPr>
+          <a:xfrm>
+            <a:off x="511713" y="508000"/>
+            <a:ext cx="1053494" cy="646331"/>
+          </a:xfrm>
+          <a:prstGeom prst="rect">
+            <a:avLst/>
+          </a:prstGeom>
+          <a:noFill/>
+        </p:spPr>
+        <p:txBody>
+          <a:bodyPr wrap="none" rtlCol="0">
+            <a:spAutoFit/>
+          </a:bodyPr>
+          <a:lstStyle/>
+          <a:p>
+            <a:r>
+              <a:rPr lang="ko-KR" altLang="en-US" sz="3600" b="1" dirty="0">
+                <a:solidFill>
+                  <a:srgbClr val="1171A4"/>
+                </a:solidFill>
+                <a:latin typeface="나눔고딕" panose="020D0604000000000000" pitchFamily="50" charset="-127"/>
+                <a:ea typeface="나눔고딕" panose="020D0604000000000000" pitchFamily="50" charset="-127"/>
+              </a:rPr>
+              <a:t>결과</a:t>
+            </a:r>
+          </a:p>
+        </p:txBody>
+      </p:sp>
+      <p:pic>
+        <p:nvPicPr>
+          <p:cNvPr id="2052" name="Picture 4">
+            <a:extLst>
+              <a:ext uri="{FF2B5EF4-FFF2-40B4-BE49-F238E27FC236}">
+                <a16:creationId xmlns:a16="http://schemas.microsoft.com/office/drawing/2014/main" id="{215B1D18-5447-2C50-9FD4-5081A86CC433}"/>
+              </a:ext>
+            </a:extLst>
+          </p:cNvPr>
+          <p:cNvPicPr>
+            <a:picLocks noChangeAspect="1" noChangeArrowheads="1"/>
+          </p:cNvPicPr>
+          <p:nvPr/>
+        </p:nvPicPr>
+        <p:blipFill>
+          <a:blip r:embed="rId2">
+            <a:extLst>
+              <a:ext uri="{28A0092B-C50C-407E-A947-70E740481C1C}">
+                <a14:useLocalDpi xmlns:a14="http://schemas.microsoft.com/office/drawing/2010/main" val="0"/>
+              </a:ext>
+            </a:extLst>
+          </a:blip>
+          <a:srcRect/>
+          <a:stretch>
+            <a:fillRect/>
+          </a:stretch>
+        </p:blipFill>
+        <p:spPr bwMode="auto">
+          <a:xfrm>
+            <a:off x="3738520" y="694576"/>
+            <a:ext cx="7063713" cy="5946072"/>
+          </a:xfrm>
+          <a:prstGeom prst="rect">
+            <a:avLst/>
+          </a:prstGeom>
+          <a:noFill/>
+          <a:extLst>
+            <a:ext uri="{909E8E84-426E-40DD-AFC4-6F175D3DCCD1}">
+              <a14:hiddenFill xmlns:a14="http://schemas.microsoft.com/office/drawing/2010/main">
+                <a:solidFill>
+                  <a:srgbClr val="FFFFFF"/>
+                </a:solidFill>
+              </a14:hiddenFill>
+            </a:ext>
+          </a:extLst>
+        </p:spPr>
+      </p:pic>
+    </p:spTree>
+    <p:extLst>
+      <p:ext uri="{BB962C8B-B14F-4D97-AF65-F5344CB8AC3E}">
+        <p14:creationId xmlns:p14="http://schemas.microsoft.com/office/powerpoint/2010/main" val="2537614656"/>
+      </p:ext>
+    </p:extLst>
+  </p:cSld>
+  <p:clrMapOvr>
+    <a:masterClrMapping/>
+  </p:clrMapOvr>
+</p:sld>
+</file>
+
+<file path=ppt/slides/slide36.xml><?xml version="1.0" encoding="utf-8"?>
 <p:sld xmlns:a="http://schemas.openxmlformats.org/drawingml/2006/main" xmlns:r="http://schemas.openxmlformats.org/officeDocument/2006/relationships" xmlns:p="http://schemas.openxmlformats.org/presentationml/2006/main">
   <p:cSld>
     <p:spTree>

</xml_diff>